<commit_message>
[LAM] 1. Table 1 2. workflow 3. MDS plots
</commit_message>
<xml_diff>
--- a/LAM/figure and table/Workflow.pptx
+++ b/LAM/figure and table/Workflow.pptx
@@ -126,7 +126,7 @@
   </p:defaultTextStyle>
   <p:extLst>
     <p:ext uri="{EFAFB233-063F-42B5-8137-9DF3F51BA10A}">
-      <p15:sldGuideLst xmlns:p15="http://schemas.microsoft.com/office/powerpoint/2012/main">
+      <p15:sldGuideLst xmlns:p15="http://schemas.microsoft.com/office/powerpoint/2012/main" xmlns="">
         <p15:guide id="1" orient="horz" pos="3968">
           <p15:clr>
             <a:srgbClr val="A4A3A4"/>
@@ -225,7 +225,7 @@
           <a:p>
             <a:fld id="{E8947227-8112-4F40-AA39-2CC5778266F5}" type="datetimeFigureOut">
               <a:rPr lang="ko-KR" altLang="en-US" smtClean="0"/>
-              <a:t>2018-10-10</a:t>
+              <a:t>2018-10-11</a:t>
             </a:fld>
             <a:endParaRPr lang="ko-KR" altLang="en-US"/>
           </a:p>
@@ -539,7 +539,15 @@
           <a:p>
             <a:r>
               <a:rPr lang="en-US" altLang="ko-KR" dirty="0" smtClean="0"/>
-              <a:t>94500000-97500000</a:t>
+              <a:t>Only </a:t>
+            </a:r>
+            <a:r>
+              <a:rPr lang="en-US" altLang="ko-KR" smtClean="0"/>
+              <a:t>CLR subjects &amp;</a:t>
+            </a:r>
+            <a:r>
+              <a:rPr lang="en-US" altLang="ko-KR" baseline="0" smtClean="0"/>
+              <a:t> </a:t>
             </a:r>
             <a:endParaRPr lang="ko-KR" altLang="en-US" dirty="0"/>
           </a:p>
@@ -562,7 +570,7 @@
           <a:p>
             <a:fld id="{C2DA64BA-F853-4D9A-88C0-60F91E66E31F}" type="slidenum">
               <a:rPr lang="ko-KR" altLang="en-US" smtClean="0"/>
-              <a:t>13</a:t>
+              <a:t>8</a:t>
             </a:fld>
             <a:endParaRPr lang="ko-KR" altLang="en-US"/>
           </a:p>
@@ -571,7 +579,7 @@
     </p:spTree>
     <p:extLst>
       <p:ext uri="{BB962C8B-B14F-4D97-AF65-F5344CB8AC3E}">
-        <p14:creationId xmlns:p14="http://schemas.microsoft.com/office/powerpoint/2010/main" val="3588287525"/>
+        <p14:creationId xmlns:p14="http://schemas.microsoft.com/office/powerpoint/2010/main" val="1598334156"/>
       </p:ext>
     </p:extLst>
   </p:cSld>
@@ -650,7 +658,7 @@
           <a:p>
             <a:fld id="{C2DA64BA-F853-4D9A-88C0-60F91E66E31F}" type="slidenum">
               <a:rPr lang="ko-KR" altLang="en-US" smtClean="0"/>
-              <a:t>14</a:t>
+              <a:t>13</a:t>
             </a:fld>
             <a:endParaRPr lang="ko-KR" altLang="en-US"/>
           </a:p>
@@ -738,6 +746,94 @@
           <a:p>
             <a:fld id="{C2DA64BA-F853-4D9A-88C0-60F91E66E31F}" type="slidenum">
               <a:rPr lang="ko-KR" altLang="en-US" smtClean="0"/>
+              <a:t>14</a:t>
+            </a:fld>
+            <a:endParaRPr lang="ko-KR" altLang="en-US"/>
+          </a:p>
+        </p:txBody>
+      </p:sp>
+    </p:spTree>
+    <p:extLst>
+      <p:ext uri="{BB962C8B-B14F-4D97-AF65-F5344CB8AC3E}">
+        <p14:creationId xmlns:p14="http://schemas.microsoft.com/office/powerpoint/2010/main" val="3588287525"/>
+      </p:ext>
+    </p:extLst>
+  </p:cSld>
+  <p:clrMapOvr>
+    <a:masterClrMapping/>
+  </p:clrMapOvr>
+</p:notes>
+</file>
+
+<file path=ppt/notesSlides/notesSlide4.xml><?xml version="1.0" encoding="utf-8"?>
+<p:notes xmlns:a="http://schemas.openxmlformats.org/drawingml/2006/main" xmlns:r="http://schemas.openxmlformats.org/officeDocument/2006/relationships" xmlns:p="http://schemas.openxmlformats.org/presentationml/2006/main">
+  <p:cSld>
+    <p:spTree>
+      <p:nvGrpSpPr>
+        <p:cNvPr id="1" name=""/>
+        <p:cNvGrpSpPr/>
+        <p:nvPr/>
+      </p:nvGrpSpPr>
+      <p:grpSpPr>
+        <a:xfrm>
+          <a:off x="0" y="0"/>
+          <a:ext cx="0" cy="0"/>
+          <a:chOff x="0" y="0"/>
+          <a:chExt cx="0" cy="0"/>
+        </a:xfrm>
+      </p:grpSpPr>
+      <p:sp>
+        <p:nvSpPr>
+          <p:cNvPr id="2" name="슬라이드 이미지 개체 틀 1"/>
+          <p:cNvSpPr>
+            <a:spLocks noGrp="1" noRot="1" noChangeAspect="1"/>
+          </p:cNvSpPr>
+          <p:nvPr>
+            <p:ph type="sldImg"/>
+          </p:nvPr>
+        </p:nvSpPr>
+        <p:spPr/>
+      </p:sp>
+      <p:sp>
+        <p:nvSpPr>
+          <p:cNvPr id="3" name="슬라이드 노트 개체 틀 2"/>
+          <p:cNvSpPr>
+            <a:spLocks noGrp="1"/>
+          </p:cNvSpPr>
+          <p:nvPr>
+            <p:ph type="body" idx="1"/>
+          </p:nvPr>
+        </p:nvSpPr>
+        <p:spPr/>
+        <p:txBody>
+          <a:bodyPr/>
+          <a:lstStyle/>
+          <a:p>
+            <a:r>
+              <a:rPr lang="en-US" altLang="ko-KR" dirty="0" smtClean="0"/>
+              <a:t>94500000-97500000</a:t>
+            </a:r>
+            <a:endParaRPr lang="ko-KR" altLang="en-US" dirty="0"/>
+          </a:p>
+        </p:txBody>
+      </p:sp>
+      <p:sp>
+        <p:nvSpPr>
+          <p:cNvPr id="4" name="슬라이드 번호 개체 틀 3"/>
+          <p:cNvSpPr>
+            <a:spLocks noGrp="1"/>
+          </p:cNvSpPr>
+          <p:nvPr>
+            <p:ph type="sldNum" sz="quarter" idx="10"/>
+          </p:nvPr>
+        </p:nvSpPr>
+        <p:spPr/>
+        <p:txBody>
+          <a:bodyPr/>
+          <a:lstStyle/>
+          <a:p>
+            <a:fld id="{C2DA64BA-F853-4D9A-88C0-60F91E66E31F}" type="slidenum">
+              <a:rPr lang="ko-KR" altLang="en-US" smtClean="0"/>
               <a:t>15</a:t>
             </a:fld>
             <a:endParaRPr lang="ko-KR" altLang="en-US"/>
@@ -888,7 +984,7 @@
           <a:p>
             <a:fld id="{A5F1C6E4-FA51-4A84-B8A9-34B441727310}" type="datetimeFigureOut">
               <a:rPr lang="ko-KR" altLang="en-US" smtClean="0"/>
-              <a:t>2018-10-10</a:t>
+              <a:t>2018-10-11</a:t>
             </a:fld>
             <a:endParaRPr lang="ko-KR" altLang="en-US"/>
           </a:p>
@@ -1058,7 +1154,7 @@
           <a:p>
             <a:fld id="{A5F1C6E4-FA51-4A84-B8A9-34B441727310}" type="datetimeFigureOut">
               <a:rPr lang="ko-KR" altLang="en-US" smtClean="0"/>
-              <a:t>2018-10-10</a:t>
+              <a:t>2018-10-11</a:t>
             </a:fld>
             <a:endParaRPr lang="ko-KR" altLang="en-US"/>
           </a:p>
@@ -1238,7 +1334,7 @@
           <a:p>
             <a:fld id="{A5F1C6E4-FA51-4A84-B8A9-34B441727310}" type="datetimeFigureOut">
               <a:rPr lang="ko-KR" altLang="en-US" smtClean="0"/>
-              <a:t>2018-10-10</a:t>
+              <a:t>2018-10-11</a:t>
             </a:fld>
             <a:endParaRPr lang="ko-KR" altLang="en-US"/>
           </a:p>
@@ -1408,7 +1504,7 @@
           <a:p>
             <a:fld id="{A5F1C6E4-FA51-4A84-B8A9-34B441727310}" type="datetimeFigureOut">
               <a:rPr lang="ko-KR" altLang="en-US" smtClean="0"/>
-              <a:t>2018-10-10</a:t>
+              <a:t>2018-10-11</a:t>
             </a:fld>
             <a:endParaRPr lang="ko-KR" altLang="en-US"/>
           </a:p>
@@ -1652,7 +1748,7 @@
           <a:p>
             <a:fld id="{A5F1C6E4-FA51-4A84-B8A9-34B441727310}" type="datetimeFigureOut">
               <a:rPr lang="ko-KR" altLang="en-US" smtClean="0"/>
-              <a:t>2018-10-10</a:t>
+              <a:t>2018-10-11</a:t>
             </a:fld>
             <a:endParaRPr lang="ko-KR" altLang="en-US"/>
           </a:p>
@@ -1884,7 +1980,7 @@
           <a:p>
             <a:fld id="{A5F1C6E4-FA51-4A84-B8A9-34B441727310}" type="datetimeFigureOut">
               <a:rPr lang="ko-KR" altLang="en-US" smtClean="0"/>
-              <a:t>2018-10-10</a:t>
+              <a:t>2018-10-11</a:t>
             </a:fld>
             <a:endParaRPr lang="ko-KR" altLang="en-US"/>
           </a:p>
@@ -2251,7 +2347,7 @@
           <a:p>
             <a:fld id="{A5F1C6E4-FA51-4A84-B8A9-34B441727310}" type="datetimeFigureOut">
               <a:rPr lang="ko-KR" altLang="en-US" smtClean="0"/>
-              <a:t>2018-10-10</a:t>
+              <a:t>2018-10-11</a:t>
             </a:fld>
             <a:endParaRPr lang="ko-KR" altLang="en-US"/>
           </a:p>
@@ -2369,7 +2465,7 @@
           <a:p>
             <a:fld id="{A5F1C6E4-FA51-4A84-B8A9-34B441727310}" type="datetimeFigureOut">
               <a:rPr lang="ko-KR" altLang="en-US" smtClean="0"/>
-              <a:t>2018-10-10</a:t>
+              <a:t>2018-10-11</a:t>
             </a:fld>
             <a:endParaRPr lang="ko-KR" altLang="en-US"/>
           </a:p>
@@ -2464,7 +2560,7 @@
           <a:p>
             <a:fld id="{A5F1C6E4-FA51-4A84-B8A9-34B441727310}" type="datetimeFigureOut">
               <a:rPr lang="ko-KR" altLang="en-US" smtClean="0"/>
-              <a:t>2018-10-10</a:t>
+              <a:t>2018-10-11</a:t>
             </a:fld>
             <a:endParaRPr lang="ko-KR" altLang="en-US"/>
           </a:p>
@@ -2741,7 +2837,7 @@
           <a:p>
             <a:fld id="{A5F1C6E4-FA51-4A84-B8A9-34B441727310}" type="datetimeFigureOut">
               <a:rPr lang="ko-KR" altLang="en-US" smtClean="0"/>
-              <a:t>2018-10-10</a:t>
+              <a:t>2018-10-11</a:t>
             </a:fld>
             <a:endParaRPr lang="ko-KR" altLang="en-US"/>
           </a:p>
@@ -2998,7 +3094,7 @@
           <a:p>
             <a:fld id="{A5F1C6E4-FA51-4A84-B8A9-34B441727310}" type="datetimeFigureOut">
               <a:rPr lang="ko-KR" altLang="en-US" smtClean="0"/>
-              <a:t>2018-10-10</a:t>
+              <a:t>2018-10-11</a:t>
             </a:fld>
             <a:endParaRPr lang="ko-KR" altLang="en-US"/>
           </a:p>
@@ -3211,7 +3307,7 @@
           <a:p>
             <a:fld id="{A5F1C6E4-FA51-4A84-B8A9-34B441727310}" type="datetimeFigureOut">
               <a:rPr lang="ko-KR" altLang="en-US" smtClean="0"/>
-              <a:t>2018-10-10</a:t>
+              <a:t>2018-10-11</a:t>
             </a:fld>
             <a:endParaRPr lang="ko-KR" altLang="en-US"/>
           </a:p>
@@ -5434,42 +5530,42 @@
                 <a:gridCol w="621843">
                   <a:extLst>
                     <a:ext uri="{9D8B030D-6E8A-4147-A177-3AD203B41FA5}">
-                      <a16:colId xmlns:a16="http://schemas.microsoft.com/office/drawing/2014/main" val="20000"/>
+                      <a16:colId xmlns:a16="http://schemas.microsoft.com/office/drawing/2014/main" xmlns="" val="20000"/>
                     </a:ext>
                   </a:extLst>
                 </a:gridCol>
                 <a:gridCol w="406101">
                   <a:extLst>
                     <a:ext uri="{9D8B030D-6E8A-4147-A177-3AD203B41FA5}">
-                      <a16:colId xmlns:a16="http://schemas.microsoft.com/office/drawing/2014/main" val="20001"/>
+                      <a16:colId xmlns:a16="http://schemas.microsoft.com/office/drawing/2014/main" xmlns="" val="20001"/>
                     </a:ext>
                   </a:extLst>
                 </a:gridCol>
                 <a:gridCol w="723368">
                   <a:extLst>
                     <a:ext uri="{9D8B030D-6E8A-4147-A177-3AD203B41FA5}">
-                      <a16:colId xmlns:a16="http://schemas.microsoft.com/office/drawing/2014/main" val="20002"/>
+                      <a16:colId xmlns:a16="http://schemas.microsoft.com/office/drawing/2014/main" xmlns="" val="20002"/>
                     </a:ext>
                   </a:extLst>
                 </a:gridCol>
                 <a:gridCol w="723368">
                   <a:extLst>
                     <a:ext uri="{9D8B030D-6E8A-4147-A177-3AD203B41FA5}">
-                      <a16:colId xmlns:a16="http://schemas.microsoft.com/office/drawing/2014/main" val="20003"/>
+                      <a16:colId xmlns:a16="http://schemas.microsoft.com/office/drawing/2014/main" xmlns="" val="20003"/>
                     </a:ext>
                   </a:extLst>
                 </a:gridCol>
                 <a:gridCol w="1243686">
                   <a:extLst>
                     <a:ext uri="{9D8B030D-6E8A-4147-A177-3AD203B41FA5}">
-                      <a16:colId xmlns:a16="http://schemas.microsoft.com/office/drawing/2014/main" val="20004"/>
+                      <a16:colId xmlns:a16="http://schemas.microsoft.com/office/drawing/2014/main" xmlns="" val="20004"/>
                     </a:ext>
                   </a:extLst>
                 </a:gridCol>
                 <a:gridCol w="599634">
                   <a:extLst>
                     <a:ext uri="{9D8B030D-6E8A-4147-A177-3AD203B41FA5}">
-                      <a16:colId xmlns:a16="http://schemas.microsoft.com/office/drawing/2014/main" val="20005"/>
+                      <a16:colId xmlns:a16="http://schemas.microsoft.com/office/drawing/2014/main" xmlns="" val="20005"/>
                     </a:ext>
                   </a:extLst>
                 </a:gridCol>
@@ -5763,7 +5859,7 @@
                 </a:tc>
                 <a:extLst>
                   <a:ext uri="{0D108BD9-81ED-4DB2-BD59-A6C34878D82A}">
-                    <a16:rowId xmlns:a16="http://schemas.microsoft.com/office/drawing/2014/main" val="10000"/>
+                    <a16:rowId xmlns:a16="http://schemas.microsoft.com/office/drawing/2014/main" xmlns="" val="10000"/>
                   </a:ext>
                 </a:extLst>
               </a:tr>
@@ -5986,7 +6082,7 @@
                 </a:tc>
                 <a:extLst>
                   <a:ext uri="{0D108BD9-81ED-4DB2-BD59-A6C34878D82A}">
-                    <a16:rowId xmlns:a16="http://schemas.microsoft.com/office/drawing/2014/main" val="10001"/>
+                    <a16:rowId xmlns:a16="http://schemas.microsoft.com/office/drawing/2014/main" xmlns="" val="10001"/>
                   </a:ext>
                 </a:extLst>
               </a:tr>
@@ -6149,7 +6245,7 @@
                 </a:tc>
                 <a:extLst>
                   <a:ext uri="{0D108BD9-81ED-4DB2-BD59-A6C34878D82A}">
-                    <a16:rowId xmlns:a16="http://schemas.microsoft.com/office/drawing/2014/main" val="10002"/>
+                    <a16:rowId xmlns:a16="http://schemas.microsoft.com/office/drawing/2014/main" xmlns="" val="10002"/>
                   </a:ext>
                 </a:extLst>
               </a:tr>
@@ -6372,7 +6468,7 @@
                 </a:tc>
                 <a:extLst>
                   <a:ext uri="{0D108BD9-81ED-4DB2-BD59-A6C34878D82A}">
-                    <a16:rowId xmlns:a16="http://schemas.microsoft.com/office/drawing/2014/main" val="10003"/>
+                    <a16:rowId xmlns:a16="http://schemas.microsoft.com/office/drawing/2014/main" xmlns="" val="10003"/>
                   </a:ext>
                 </a:extLst>
               </a:tr>
@@ -6438,28 +6534,28 @@
                 <a:gridCol w="2700073">
                   <a:extLst>
                     <a:ext uri="{9D8B030D-6E8A-4147-A177-3AD203B41FA5}">
-                      <a16:colId xmlns:a16="http://schemas.microsoft.com/office/drawing/2014/main" val="20000"/>
+                      <a16:colId xmlns:a16="http://schemas.microsoft.com/office/drawing/2014/main" xmlns="" val="20000"/>
                     </a:ext>
                   </a:extLst>
                 </a:gridCol>
                 <a:gridCol w="2700073">
                   <a:extLst>
                     <a:ext uri="{9D8B030D-6E8A-4147-A177-3AD203B41FA5}">
-                      <a16:colId xmlns:a16="http://schemas.microsoft.com/office/drawing/2014/main" val="20001"/>
+                      <a16:colId xmlns:a16="http://schemas.microsoft.com/office/drawing/2014/main" xmlns="" val="20001"/>
                     </a:ext>
                   </a:extLst>
                 </a:gridCol>
                 <a:gridCol w="2700073">
                   <a:extLst>
                     <a:ext uri="{9D8B030D-6E8A-4147-A177-3AD203B41FA5}">
-                      <a16:colId xmlns:a16="http://schemas.microsoft.com/office/drawing/2014/main" val="20002"/>
+                      <a16:colId xmlns:a16="http://schemas.microsoft.com/office/drawing/2014/main" xmlns="" val="20002"/>
                     </a:ext>
                   </a:extLst>
                 </a:gridCol>
                 <a:gridCol w="2700073">
                   <a:extLst>
                     <a:ext uri="{9D8B030D-6E8A-4147-A177-3AD203B41FA5}">
-                      <a16:colId xmlns:a16="http://schemas.microsoft.com/office/drawing/2014/main" val="20003"/>
+                      <a16:colId xmlns:a16="http://schemas.microsoft.com/office/drawing/2014/main" xmlns="" val="20003"/>
                     </a:ext>
                   </a:extLst>
                 </a:gridCol>
@@ -6523,7 +6619,7 @@
                 </a:tc>
                 <a:extLst>
                   <a:ext uri="{0D108BD9-81ED-4DB2-BD59-A6C34878D82A}">
-                    <a16:rowId xmlns:a16="http://schemas.microsoft.com/office/drawing/2014/main" val="10000"/>
+                    <a16:rowId xmlns:a16="http://schemas.microsoft.com/office/drawing/2014/main" xmlns="" val="10000"/>
                   </a:ext>
                 </a:extLst>
               </a:tr>
@@ -6594,7 +6690,7 @@
                 </a:tc>
                 <a:extLst>
                   <a:ext uri="{0D108BD9-81ED-4DB2-BD59-A6C34878D82A}">
-                    <a16:rowId xmlns:a16="http://schemas.microsoft.com/office/drawing/2014/main" val="10001"/>
+                    <a16:rowId xmlns:a16="http://schemas.microsoft.com/office/drawing/2014/main" xmlns="" val="10001"/>
                   </a:ext>
                 </a:extLst>
               </a:tr>
@@ -6645,7 +6741,7 @@
                 </a:tc>
                 <a:extLst>
                   <a:ext uri="{0D108BD9-81ED-4DB2-BD59-A6C34878D82A}">
-                    <a16:rowId xmlns:a16="http://schemas.microsoft.com/office/drawing/2014/main" val="10002"/>
+                    <a16:rowId xmlns:a16="http://schemas.microsoft.com/office/drawing/2014/main" xmlns="" val="10002"/>
                   </a:ext>
                 </a:extLst>
               </a:tr>
@@ -6696,7 +6792,7 @@
                 </a:tc>
                 <a:extLst>
                   <a:ext uri="{0D108BD9-81ED-4DB2-BD59-A6C34878D82A}">
-                    <a16:rowId xmlns:a16="http://schemas.microsoft.com/office/drawing/2014/main" val="10003"/>
+                    <a16:rowId xmlns:a16="http://schemas.microsoft.com/office/drawing/2014/main" xmlns="" val="10003"/>
                   </a:ext>
                 </a:extLst>
               </a:tr>
@@ -6767,7 +6863,7 @@
                 </a:tc>
                 <a:extLst>
                   <a:ext uri="{0D108BD9-81ED-4DB2-BD59-A6C34878D82A}">
-                    <a16:rowId xmlns:a16="http://schemas.microsoft.com/office/drawing/2014/main" val="10004"/>
+                    <a16:rowId xmlns:a16="http://schemas.microsoft.com/office/drawing/2014/main" xmlns="" val="10004"/>
                   </a:ext>
                 </a:extLst>
               </a:tr>
@@ -6818,7 +6914,7 @@
                 </a:tc>
                 <a:extLst>
                   <a:ext uri="{0D108BD9-81ED-4DB2-BD59-A6C34878D82A}">
-                    <a16:rowId xmlns:a16="http://schemas.microsoft.com/office/drawing/2014/main" val="10005"/>
+                    <a16:rowId xmlns:a16="http://schemas.microsoft.com/office/drawing/2014/main" xmlns="" val="10005"/>
                   </a:ext>
                 </a:extLst>
               </a:tr>
@@ -6869,7 +6965,7 @@
                 </a:tc>
                 <a:extLst>
                   <a:ext uri="{0D108BD9-81ED-4DB2-BD59-A6C34878D82A}">
-                    <a16:rowId xmlns:a16="http://schemas.microsoft.com/office/drawing/2014/main" val="10006"/>
+                    <a16:rowId xmlns:a16="http://schemas.microsoft.com/office/drawing/2014/main" xmlns="" val="10006"/>
                   </a:ext>
                 </a:extLst>
               </a:tr>
@@ -6940,7 +7036,7 @@
                 </a:tc>
                 <a:extLst>
                   <a:ext uri="{0D108BD9-81ED-4DB2-BD59-A6C34878D82A}">
-                    <a16:rowId xmlns:a16="http://schemas.microsoft.com/office/drawing/2014/main" val="10007"/>
+                    <a16:rowId xmlns:a16="http://schemas.microsoft.com/office/drawing/2014/main" xmlns="" val="10007"/>
                   </a:ext>
                 </a:extLst>
               </a:tr>
@@ -6991,7 +7087,7 @@
                 </a:tc>
                 <a:extLst>
                   <a:ext uri="{0D108BD9-81ED-4DB2-BD59-A6C34878D82A}">
-                    <a16:rowId xmlns:a16="http://schemas.microsoft.com/office/drawing/2014/main" val="10008"/>
+                    <a16:rowId xmlns:a16="http://schemas.microsoft.com/office/drawing/2014/main" xmlns="" val="10008"/>
                   </a:ext>
                 </a:extLst>
               </a:tr>
@@ -7042,7 +7138,7 @@
                 </a:tc>
                 <a:extLst>
                   <a:ext uri="{0D108BD9-81ED-4DB2-BD59-A6C34878D82A}">
-                    <a16:rowId xmlns:a16="http://schemas.microsoft.com/office/drawing/2014/main" val="10009"/>
+                    <a16:rowId xmlns:a16="http://schemas.microsoft.com/office/drawing/2014/main" xmlns="" val="10009"/>
                   </a:ext>
                 </a:extLst>
               </a:tr>
@@ -7113,7 +7209,7 @@
                 </a:tc>
                 <a:extLst>
                   <a:ext uri="{0D108BD9-81ED-4DB2-BD59-A6C34878D82A}">
-                    <a16:rowId xmlns:a16="http://schemas.microsoft.com/office/drawing/2014/main" val="10010"/>
+                    <a16:rowId xmlns:a16="http://schemas.microsoft.com/office/drawing/2014/main" xmlns="" val="10010"/>
                   </a:ext>
                 </a:extLst>
               </a:tr>
@@ -7164,7 +7260,7 @@
                 </a:tc>
                 <a:extLst>
                   <a:ext uri="{0D108BD9-81ED-4DB2-BD59-A6C34878D82A}">
-                    <a16:rowId xmlns:a16="http://schemas.microsoft.com/office/drawing/2014/main" val="10011"/>
+                    <a16:rowId xmlns:a16="http://schemas.microsoft.com/office/drawing/2014/main" xmlns="" val="10011"/>
                   </a:ext>
                 </a:extLst>
               </a:tr>
@@ -7215,7 +7311,7 @@
                 </a:tc>
                 <a:extLst>
                   <a:ext uri="{0D108BD9-81ED-4DB2-BD59-A6C34878D82A}">
-                    <a16:rowId xmlns:a16="http://schemas.microsoft.com/office/drawing/2014/main" val="10012"/>
+                    <a16:rowId xmlns:a16="http://schemas.microsoft.com/office/drawing/2014/main" xmlns="" val="10012"/>
                   </a:ext>
                 </a:extLst>
               </a:tr>
@@ -7286,7 +7382,7 @@
                 </a:tc>
                 <a:extLst>
                   <a:ext uri="{0D108BD9-81ED-4DB2-BD59-A6C34878D82A}">
-                    <a16:rowId xmlns:a16="http://schemas.microsoft.com/office/drawing/2014/main" val="10013"/>
+                    <a16:rowId xmlns:a16="http://schemas.microsoft.com/office/drawing/2014/main" xmlns="" val="10013"/>
                   </a:ext>
                 </a:extLst>
               </a:tr>
@@ -7337,7 +7433,7 @@
                 </a:tc>
                 <a:extLst>
                   <a:ext uri="{0D108BD9-81ED-4DB2-BD59-A6C34878D82A}">
-                    <a16:rowId xmlns:a16="http://schemas.microsoft.com/office/drawing/2014/main" val="10014"/>
+                    <a16:rowId xmlns:a16="http://schemas.microsoft.com/office/drawing/2014/main" xmlns="" val="10014"/>
                   </a:ext>
                 </a:extLst>
               </a:tr>
@@ -7388,7 +7484,7 @@
                 </a:tc>
                 <a:extLst>
                   <a:ext uri="{0D108BD9-81ED-4DB2-BD59-A6C34878D82A}">
-                    <a16:rowId xmlns:a16="http://schemas.microsoft.com/office/drawing/2014/main" val="10015"/>
+                    <a16:rowId xmlns:a16="http://schemas.microsoft.com/office/drawing/2014/main" xmlns="" val="10015"/>
                   </a:ext>
                 </a:extLst>
               </a:tr>
@@ -9721,35 +9817,35 @@
                 <a:gridCol w="360000">
                   <a:extLst>
                     <a:ext uri="{9D8B030D-6E8A-4147-A177-3AD203B41FA5}">
-                      <a16:colId xmlns:a16="http://schemas.microsoft.com/office/drawing/2014/main" val="20000"/>
+                      <a16:colId xmlns:a16="http://schemas.microsoft.com/office/drawing/2014/main" xmlns="" val="20000"/>
                     </a:ext>
                   </a:extLst>
                 </a:gridCol>
                 <a:gridCol w="1070707">
                   <a:extLst>
                     <a:ext uri="{9D8B030D-6E8A-4147-A177-3AD203B41FA5}">
-                      <a16:colId xmlns:a16="http://schemas.microsoft.com/office/drawing/2014/main" val="20001"/>
+                      <a16:colId xmlns:a16="http://schemas.microsoft.com/office/drawing/2014/main" xmlns="" val="20001"/>
                     </a:ext>
                   </a:extLst>
                 </a:gridCol>
                 <a:gridCol w="642424">
                   <a:extLst>
                     <a:ext uri="{9D8B030D-6E8A-4147-A177-3AD203B41FA5}">
-                      <a16:colId xmlns:a16="http://schemas.microsoft.com/office/drawing/2014/main" val="20002"/>
+                      <a16:colId xmlns:a16="http://schemas.microsoft.com/office/drawing/2014/main" xmlns="" val="20002"/>
                     </a:ext>
                   </a:extLst>
                 </a:gridCol>
                 <a:gridCol w="828000">
                   <a:extLst>
                     <a:ext uri="{9D8B030D-6E8A-4147-A177-3AD203B41FA5}">
-                      <a16:colId xmlns:a16="http://schemas.microsoft.com/office/drawing/2014/main" val="20003"/>
+                      <a16:colId xmlns:a16="http://schemas.microsoft.com/office/drawing/2014/main" xmlns="" val="20003"/>
                     </a:ext>
                   </a:extLst>
                 </a:gridCol>
                 <a:gridCol w="828000">
                   <a:extLst>
                     <a:ext uri="{9D8B030D-6E8A-4147-A177-3AD203B41FA5}">
-                      <a16:colId xmlns:a16="http://schemas.microsoft.com/office/drawing/2014/main" val="20004"/>
+                      <a16:colId xmlns:a16="http://schemas.microsoft.com/office/drawing/2014/main" xmlns="" val="20004"/>
                     </a:ext>
                   </a:extLst>
                 </a:gridCol>
@@ -9987,7 +10083,7 @@
                 </a:tc>
                 <a:extLst>
                   <a:ext uri="{0D108BD9-81ED-4DB2-BD59-A6C34878D82A}">
-                    <a16:rowId xmlns:a16="http://schemas.microsoft.com/office/drawing/2014/main" val="10000"/>
+                    <a16:rowId xmlns:a16="http://schemas.microsoft.com/office/drawing/2014/main" xmlns="" val="10000"/>
                   </a:ext>
                 </a:extLst>
               </a:tr>
@@ -10192,7 +10288,7 @@
                 </a:tc>
                 <a:extLst>
                   <a:ext uri="{0D108BD9-81ED-4DB2-BD59-A6C34878D82A}">
-                    <a16:rowId xmlns:a16="http://schemas.microsoft.com/office/drawing/2014/main" val="10001"/>
+                    <a16:rowId xmlns:a16="http://schemas.microsoft.com/office/drawing/2014/main" xmlns="" val="10001"/>
                   </a:ext>
                 </a:extLst>
               </a:tr>
@@ -10395,7 +10491,7 @@
                 </a:tc>
                 <a:extLst>
                   <a:ext uri="{0D108BD9-81ED-4DB2-BD59-A6C34878D82A}">
-                    <a16:rowId xmlns:a16="http://schemas.microsoft.com/office/drawing/2014/main" val="10002"/>
+                    <a16:rowId xmlns:a16="http://schemas.microsoft.com/office/drawing/2014/main" xmlns="" val="10002"/>
                   </a:ext>
                 </a:extLst>
               </a:tr>
@@ -10568,7 +10664,7 @@
                 </a:tc>
                 <a:extLst>
                   <a:ext uri="{0D108BD9-81ED-4DB2-BD59-A6C34878D82A}">
-                    <a16:rowId xmlns:a16="http://schemas.microsoft.com/office/drawing/2014/main" val="10003"/>
+                    <a16:rowId xmlns:a16="http://schemas.microsoft.com/office/drawing/2014/main" xmlns="" val="10003"/>
                   </a:ext>
                 </a:extLst>
               </a:tr>
@@ -10741,7 +10837,7 @@
                 </a:tc>
                 <a:extLst>
                   <a:ext uri="{0D108BD9-81ED-4DB2-BD59-A6C34878D82A}">
-                    <a16:rowId xmlns:a16="http://schemas.microsoft.com/office/drawing/2014/main" val="10004"/>
+                    <a16:rowId xmlns:a16="http://schemas.microsoft.com/office/drawing/2014/main" xmlns="" val="10004"/>
                   </a:ext>
                 </a:extLst>
               </a:tr>
@@ -10914,7 +11010,7 @@
                 </a:tc>
                 <a:extLst>
                   <a:ext uri="{0D108BD9-81ED-4DB2-BD59-A6C34878D82A}">
-                    <a16:rowId xmlns:a16="http://schemas.microsoft.com/office/drawing/2014/main" val="10005"/>
+                    <a16:rowId xmlns:a16="http://schemas.microsoft.com/office/drawing/2014/main" xmlns="" val="10005"/>
                   </a:ext>
                 </a:extLst>
               </a:tr>
@@ -11087,7 +11183,7 @@
                 </a:tc>
                 <a:extLst>
                   <a:ext uri="{0D108BD9-81ED-4DB2-BD59-A6C34878D82A}">
-                    <a16:rowId xmlns:a16="http://schemas.microsoft.com/office/drawing/2014/main" val="10006"/>
+                    <a16:rowId xmlns:a16="http://schemas.microsoft.com/office/drawing/2014/main" xmlns="" val="10006"/>
                   </a:ext>
                 </a:extLst>
               </a:tr>
@@ -11260,7 +11356,7 @@
                 </a:tc>
                 <a:extLst>
                   <a:ext uri="{0D108BD9-81ED-4DB2-BD59-A6C34878D82A}">
-                    <a16:rowId xmlns:a16="http://schemas.microsoft.com/office/drawing/2014/main" val="10007"/>
+                    <a16:rowId xmlns:a16="http://schemas.microsoft.com/office/drawing/2014/main" xmlns="" val="10007"/>
                   </a:ext>
                 </a:extLst>
               </a:tr>
@@ -11433,7 +11529,7 @@
                 </a:tc>
                 <a:extLst>
                   <a:ext uri="{0D108BD9-81ED-4DB2-BD59-A6C34878D82A}">
-                    <a16:rowId xmlns:a16="http://schemas.microsoft.com/office/drawing/2014/main" val="10008"/>
+                    <a16:rowId xmlns:a16="http://schemas.microsoft.com/office/drawing/2014/main" xmlns="" val="10008"/>
                   </a:ext>
                 </a:extLst>
               </a:tr>
@@ -11606,7 +11702,7 @@
                 </a:tc>
                 <a:extLst>
                   <a:ext uri="{0D108BD9-81ED-4DB2-BD59-A6C34878D82A}">
-                    <a16:rowId xmlns:a16="http://schemas.microsoft.com/office/drawing/2014/main" val="10009"/>
+                    <a16:rowId xmlns:a16="http://schemas.microsoft.com/office/drawing/2014/main" xmlns="" val="10009"/>
                   </a:ext>
                 </a:extLst>
               </a:tr>
@@ -11779,7 +11875,7 @@
                 </a:tc>
                 <a:extLst>
                   <a:ext uri="{0D108BD9-81ED-4DB2-BD59-A6C34878D82A}">
-                    <a16:rowId xmlns:a16="http://schemas.microsoft.com/office/drawing/2014/main" val="10010"/>
+                    <a16:rowId xmlns:a16="http://schemas.microsoft.com/office/drawing/2014/main" xmlns="" val="10010"/>
                   </a:ext>
                 </a:extLst>
               </a:tr>
@@ -11952,7 +12048,7 @@
                 </a:tc>
                 <a:extLst>
                   <a:ext uri="{0D108BD9-81ED-4DB2-BD59-A6C34878D82A}">
-                    <a16:rowId xmlns:a16="http://schemas.microsoft.com/office/drawing/2014/main" val="10011"/>
+                    <a16:rowId xmlns:a16="http://schemas.microsoft.com/office/drawing/2014/main" xmlns="" val="10011"/>
                   </a:ext>
                 </a:extLst>
               </a:tr>
@@ -12125,7 +12221,7 @@
                 </a:tc>
                 <a:extLst>
                   <a:ext uri="{0D108BD9-81ED-4DB2-BD59-A6C34878D82A}">
-                    <a16:rowId xmlns:a16="http://schemas.microsoft.com/office/drawing/2014/main" val="10012"/>
+                    <a16:rowId xmlns:a16="http://schemas.microsoft.com/office/drawing/2014/main" xmlns="" val="10012"/>
                   </a:ext>
                 </a:extLst>
               </a:tr>
@@ -12298,7 +12394,7 @@
                 </a:tc>
                 <a:extLst>
                   <a:ext uri="{0D108BD9-81ED-4DB2-BD59-A6C34878D82A}">
-                    <a16:rowId xmlns:a16="http://schemas.microsoft.com/office/drawing/2014/main" val="10013"/>
+                    <a16:rowId xmlns:a16="http://schemas.microsoft.com/office/drawing/2014/main" xmlns="" val="10013"/>
                   </a:ext>
                 </a:extLst>
               </a:tr>
@@ -12471,7 +12567,7 @@
                 </a:tc>
                 <a:extLst>
                   <a:ext uri="{0D108BD9-81ED-4DB2-BD59-A6C34878D82A}">
-                    <a16:rowId xmlns:a16="http://schemas.microsoft.com/office/drawing/2014/main" val="10014"/>
+                    <a16:rowId xmlns:a16="http://schemas.microsoft.com/office/drawing/2014/main" xmlns="" val="10014"/>
                   </a:ext>
                 </a:extLst>
               </a:tr>
@@ -12644,7 +12740,7 @@
                 </a:tc>
                 <a:extLst>
                   <a:ext uri="{0D108BD9-81ED-4DB2-BD59-A6C34878D82A}">
-                    <a16:rowId xmlns:a16="http://schemas.microsoft.com/office/drawing/2014/main" val="10015"/>
+                    <a16:rowId xmlns:a16="http://schemas.microsoft.com/office/drawing/2014/main" xmlns="" val="10015"/>
                   </a:ext>
                 </a:extLst>
               </a:tr>
@@ -12817,7 +12913,7 @@
                 </a:tc>
                 <a:extLst>
                   <a:ext uri="{0D108BD9-81ED-4DB2-BD59-A6C34878D82A}">
-                    <a16:rowId xmlns:a16="http://schemas.microsoft.com/office/drawing/2014/main" val="10016"/>
+                    <a16:rowId xmlns:a16="http://schemas.microsoft.com/office/drawing/2014/main" xmlns="" val="10016"/>
                   </a:ext>
                 </a:extLst>
               </a:tr>
@@ -12990,7 +13086,7 @@
                 </a:tc>
                 <a:extLst>
                   <a:ext uri="{0D108BD9-81ED-4DB2-BD59-A6C34878D82A}">
-                    <a16:rowId xmlns:a16="http://schemas.microsoft.com/office/drawing/2014/main" val="10017"/>
+                    <a16:rowId xmlns:a16="http://schemas.microsoft.com/office/drawing/2014/main" xmlns="" val="10017"/>
                   </a:ext>
                 </a:extLst>
               </a:tr>
@@ -13163,7 +13259,7 @@
                 </a:tc>
                 <a:extLst>
                   <a:ext uri="{0D108BD9-81ED-4DB2-BD59-A6C34878D82A}">
-                    <a16:rowId xmlns:a16="http://schemas.microsoft.com/office/drawing/2014/main" val="10018"/>
+                    <a16:rowId xmlns:a16="http://schemas.microsoft.com/office/drawing/2014/main" xmlns="" val="10018"/>
                   </a:ext>
                 </a:extLst>
               </a:tr>
@@ -13336,7 +13432,7 @@
                 </a:tc>
                 <a:extLst>
                   <a:ext uri="{0D108BD9-81ED-4DB2-BD59-A6C34878D82A}">
-                    <a16:rowId xmlns:a16="http://schemas.microsoft.com/office/drawing/2014/main" val="10019"/>
+                    <a16:rowId xmlns:a16="http://schemas.microsoft.com/office/drawing/2014/main" xmlns="" val="10019"/>
                   </a:ext>
                 </a:extLst>
               </a:tr>
@@ -13509,7 +13605,7 @@
                 </a:tc>
                 <a:extLst>
                   <a:ext uri="{0D108BD9-81ED-4DB2-BD59-A6C34878D82A}">
-                    <a16:rowId xmlns:a16="http://schemas.microsoft.com/office/drawing/2014/main" val="10020"/>
+                    <a16:rowId xmlns:a16="http://schemas.microsoft.com/office/drawing/2014/main" xmlns="" val="10020"/>
                   </a:ext>
                 </a:extLst>
               </a:tr>
@@ -13682,7 +13778,7 @@
                 </a:tc>
                 <a:extLst>
                   <a:ext uri="{0D108BD9-81ED-4DB2-BD59-A6C34878D82A}">
-                    <a16:rowId xmlns:a16="http://schemas.microsoft.com/office/drawing/2014/main" val="10021"/>
+                    <a16:rowId xmlns:a16="http://schemas.microsoft.com/office/drawing/2014/main" xmlns="" val="10021"/>
                   </a:ext>
                 </a:extLst>
               </a:tr>
@@ -13885,7 +13981,7 @@
                 </a:tc>
                 <a:extLst>
                   <a:ext uri="{0D108BD9-81ED-4DB2-BD59-A6C34878D82A}">
-                    <a16:rowId xmlns:a16="http://schemas.microsoft.com/office/drawing/2014/main" val="10022"/>
+                    <a16:rowId xmlns:a16="http://schemas.microsoft.com/office/drawing/2014/main" xmlns="" val="10022"/>
                   </a:ext>
                 </a:extLst>
               </a:tr>
@@ -13949,56 +14045,56 @@
                 <a:gridCol w="934680">
                   <a:extLst>
                     <a:ext uri="{9D8B030D-6E8A-4147-A177-3AD203B41FA5}">
-                      <a16:colId xmlns:a16="http://schemas.microsoft.com/office/drawing/2014/main" val="306847010"/>
+                      <a16:colId xmlns:a16="http://schemas.microsoft.com/office/drawing/2014/main" xmlns="" val="306847010"/>
                     </a:ext>
                   </a:extLst>
                 </a:gridCol>
                 <a:gridCol w="934680">
                   <a:extLst>
                     <a:ext uri="{9D8B030D-6E8A-4147-A177-3AD203B41FA5}">
-                      <a16:colId xmlns:a16="http://schemas.microsoft.com/office/drawing/2014/main" val="2366364053"/>
+                      <a16:colId xmlns:a16="http://schemas.microsoft.com/office/drawing/2014/main" xmlns="" val="2366364053"/>
                     </a:ext>
                   </a:extLst>
                 </a:gridCol>
                 <a:gridCol w="679767">
                   <a:extLst>
                     <a:ext uri="{9D8B030D-6E8A-4147-A177-3AD203B41FA5}">
-                      <a16:colId xmlns:a16="http://schemas.microsoft.com/office/drawing/2014/main" val="3755844721"/>
+                      <a16:colId xmlns:a16="http://schemas.microsoft.com/office/drawing/2014/main" xmlns="" val="3755844721"/>
                     </a:ext>
                   </a:extLst>
                 </a:gridCol>
                 <a:gridCol w="1189593">
                   <a:extLst>
                     <a:ext uri="{9D8B030D-6E8A-4147-A177-3AD203B41FA5}">
-                      <a16:colId xmlns:a16="http://schemas.microsoft.com/office/drawing/2014/main" val="564739949"/>
+                      <a16:colId xmlns:a16="http://schemas.microsoft.com/office/drawing/2014/main" xmlns="" val="564739949"/>
                     </a:ext>
                   </a:extLst>
                 </a:gridCol>
                 <a:gridCol w="1189593">
                   <a:extLst>
                     <a:ext uri="{9D8B030D-6E8A-4147-A177-3AD203B41FA5}">
-                      <a16:colId xmlns:a16="http://schemas.microsoft.com/office/drawing/2014/main" val="1235457501"/>
+                      <a16:colId xmlns:a16="http://schemas.microsoft.com/office/drawing/2014/main" xmlns="" val="1235457501"/>
                     </a:ext>
                   </a:extLst>
                 </a:gridCol>
                 <a:gridCol w="679767">
                   <a:extLst>
                     <a:ext uri="{9D8B030D-6E8A-4147-A177-3AD203B41FA5}">
-                      <a16:colId xmlns:a16="http://schemas.microsoft.com/office/drawing/2014/main" val="921992363"/>
+                      <a16:colId xmlns:a16="http://schemas.microsoft.com/office/drawing/2014/main" xmlns="" val="921992363"/>
                     </a:ext>
                   </a:extLst>
                 </a:gridCol>
                 <a:gridCol w="1189593">
                   <a:extLst>
                     <a:ext uri="{9D8B030D-6E8A-4147-A177-3AD203B41FA5}">
-                      <a16:colId xmlns:a16="http://schemas.microsoft.com/office/drawing/2014/main" val="1616714432"/>
+                      <a16:colId xmlns:a16="http://schemas.microsoft.com/office/drawing/2014/main" xmlns="" val="1616714432"/>
                     </a:ext>
                   </a:extLst>
                 </a:gridCol>
                 <a:gridCol w="762985">
                   <a:extLst>
                     <a:ext uri="{9D8B030D-6E8A-4147-A177-3AD203B41FA5}">
-                      <a16:colId xmlns:a16="http://schemas.microsoft.com/office/drawing/2014/main" val="673316080"/>
+                      <a16:colId xmlns:a16="http://schemas.microsoft.com/office/drawing/2014/main" xmlns="" val="673316080"/>
                     </a:ext>
                   </a:extLst>
                 </a:gridCol>
@@ -14329,7 +14425,7 @@
                 </a:tc>
                 <a:extLst>
                   <a:ext uri="{0D108BD9-81ED-4DB2-BD59-A6C34878D82A}">
-                    <a16:rowId xmlns:a16="http://schemas.microsoft.com/office/drawing/2014/main" val="337799944"/>
+                    <a16:rowId xmlns:a16="http://schemas.microsoft.com/office/drawing/2014/main" xmlns="" val="337799944"/>
                   </a:ext>
                 </a:extLst>
               </a:tr>
@@ -14788,7 +14884,7 @@
                 </a:tc>
                 <a:extLst>
                   <a:ext uri="{0D108BD9-81ED-4DB2-BD59-A6C34878D82A}">
-                    <a16:rowId xmlns:a16="http://schemas.microsoft.com/office/drawing/2014/main" val="552318667"/>
+                    <a16:rowId xmlns:a16="http://schemas.microsoft.com/office/drawing/2014/main" xmlns="" val="552318667"/>
                   </a:ext>
                 </a:extLst>
               </a:tr>
@@ -15384,7 +15480,7 @@
                 </a:tc>
                 <a:extLst>
                   <a:ext uri="{0D108BD9-81ED-4DB2-BD59-A6C34878D82A}">
-                    <a16:rowId xmlns:a16="http://schemas.microsoft.com/office/drawing/2014/main" val="3154322294"/>
+                    <a16:rowId xmlns:a16="http://schemas.microsoft.com/office/drawing/2014/main" xmlns="" val="3154322294"/>
                   </a:ext>
                 </a:extLst>
               </a:tr>
@@ -15678,7 +15774,7 @@
                 </a:tc>
                 <a:extLst>
                   <a:ext uri="{0D108BD9-81ED-4DB2-BD59-A6C34878D82A}">
-                    <a16:rowId xmlns:a16="http://schemas.microsoft.com/office/drawing/2014/main" val="3824680710"/>
+                    <a16:rowId xmlns:a16="http://schemas.microsoft.com/office/drawing/2014/main" xmlns="" val="3824680710"/>
                   </a:ext>
                 </a:extLst>
               </a:tr>
@@ -15976,7 +16072,7 @@
                 </a:tc>
                 <a:extLst>
                   <a:ext uri="{0D108BD9-81ED-4DB2-BD59-A6C34878D82A}">
-                    <a16:rowId xmlns:a16="http://schemas.microsoft.com/office/drawing/2014/main" val="2949066572"/>
+                    <a16:rowId xmlns:a16="http://schemas.microsoft.com/office/drawing/2014/main" xmlns="" val="2949066572"/>
                   </a:ext>
                 </a:extLst>
               </a:tr>
@@ -16270,7 +16366,7 @@
                 </a:tc>
                 <a:extLst>
                   <a:ext uri="{0D108BD9-81ED-4DB2-BD59-A6C34878D82A}">
-                    <a16:rowId xmlns:a16="http://schemas.microsoft.com/office/drawing/2014/main" val="762562684"/>
+                    <a16:rowId xmlns:a16="http://schemas.microsoft.com/office/drawing/2014/main" xmlns="" val="762562684"/>
                   </a:ext>
                 </a:extLst>
               </a:tr>
@@ -16495,7 +16591,7 @@
                 </a:tc>
                 <a:extLst>
                   <a:ext uri="{0D108BD9-81ED-4DB2-BD59-A6C34878D82A}">
-                    <a16:rowId xmlns:a16="http://schemas.microsoft.com/office/drawing/2014/main" val="2336757687"/>
+                    <a16:rowId xmlns:a16="http://schemas.microsoft.com/office/drawing/2014/main" xmlns="" val="2336757687"/>
                   </a:ext>
                 </a:extLst>
               </a:tr>
@@ -16813,7 +16909,7 @@
                 </a:tc>
                 <a:extLst>
                   <a:ext uri="{0D108BD9-81ED-4DB2-BD59-A6C34878D82A}">
-                    <a16:rowId xmlns:a16="http://schemas.microsoft.com/office/drawing/2014/main" val="739462245"/>
+                    <a16:rowId xmlns:a16="http://schemas.microsoft.com/office/drawing/2014/main" xmlns="" val="739462245"/>
                   </a:ext>
                 </a:extLst>
               </a:tr>
@@ -17409,7 +17505,7 @@
                 </a:tc>
                 <a:extLst>
                   <a:ext uri="{0D108BD9-81ED-4DB2-BD59-A6C34878D82A}">
-                    <a16:rowId xmlns:a16="http://schemas.microsoft.com/office/drawing/2014/main" val="2285249298"/>
+                    <a16:rowId xmlns:a16="http://schemas.microsoft.com/office/drawing/2014/main" xmlns="" val="2285249298"/>
                   </a:ext>
                 </a:extLst>
               </a:tr>
@@ -17703,7 +17799,7 @@
                 </a:tc>
                 <a:extLst>
                   <a:ext uri="{0D108BD9-81ED-4DB2-BD59-A6C34878D82A}">
-                    <a16:rowId xmlns:a16="http://schemas.microsoft.com/office/drawing/2014/main" val="605521000"/>
+                    <a16:rowId xmlns:a16="http://schemas.microsoft.com/office/drawing/2014/main" xmlns="" val="605521000"/>
                   </a:ext>
                 </a:extLst>
               </a:tr>
@@ -17989,7 +18085,7 @@
                 </a:tc>
                 <a:extLst>
                   <a:ext uri="{0D108BD9-81ED-4DB2-BD59-A6C34878D82A}">
-                    <a16:rowId xmlns:a16="http://schemas.microsoft.com/office/drawing/2014/main" val="3873839538"/>
+                    <a16:rowId xmlns:a16="http://schemas.microsoft.com/office/drawing/2014/main" xmlns="" val="3873839538"/>
                   </a:ext>
                 </a:extLst>
               </a:tr>
@@ -18283,7 +18379,7 @@
                 </a:tc>
                 <a:extLst>
                   <a:ext uri="{0D108BD9-81ED-4DB2-BD59-A6C34878D82A}">
-                    <a16:rowId xmlns:a16="http://schemas.microsoft.com/office/drawing/2014/main" val="121681536"/>
+                    <a16:rowId xmlns:a16="http://schemas.microsoft.com/office/drawing/2014/main" xmlns="" val="121681536"/>
                   </a:ext>
                 </a:extLst>
               </a:tr>
@@ -18508,7 +18604,7 @@
                 </a:tc>
                 <a:extLst>
                   <a:ext uri="{0D108BD9-81ED-4DB2-BD59-A6C34878D82A}">
-                    <a16:rowId xmlns:a16="http://schemas.microsoft.com/office/drawing/2014/main" val="71002534"/>
+                    <a16:rowId xmlns:a16="http://schemas.microsoft.com/office/drawing/2014/main" xmlns="" val="71002534"/>
                   </a:ext>
                 </a:extLst>
               </a:tr>
@@ -18826,7 +18922,7 @@
                 </a:tc>
                 <a:extLst>
                   <a:ext uri="{0D108BD9-81ED-4DB2-BD59-A6C34878D82A}">
-                    <a16:rowId xmlns:a16="http://schemas.microsoft.com/office/drawing/2014/main" val="273795730"/>
+                    <a16:rowId xmlns:a16="http://schemas.microsoft.com/office/drawing/2014/main" xmlns="" val="273795730"/>
                   </a:ext>
                 </a:extLst>
               </a:tr>
@@ -24531,28 +24627,28 @@
                 <a:gridCol w="904448">
                   <a:extLst>
                     <a:ext uri="{9D8B030D-6E8A-4147-A177-3AD203B41FA5}">
-                      <a16:colId xmlns:a16="http://schemas.microsoft.com/office/drawing/2014/main" val="20000"/>
+                      <a16:colId xmlns:a16="http://schemas.microsoft.com/office/drawing/2014/main" xmlns="" val="20000"/>
                     </a:ext>
                   </a:extLst>
                 </a:gridCol>
                 <a:gridCol w="4138244">
                   <a:extLst>
                     <a:ext uri="{9D8B030D-6E8A-4147-A177-3AD203B41FA5}">
-                      <a16:colId xmlns:a16="http://schemas.microsoft.com/office/drawing/2014/main" val="20001"/>
+                      <a16:colId xmlns:a16="http://schemas.microsoft.com/office/drawing/2014/main" xmlns="" val="20001"/>
                     </a:ext>
                   </a:extLst>
                 </a:gridCol>
                 <a:gridCol w="736252">
                   <a:extLst>
                     <a:ext uri="{9D8B030D-6E8A-4147-A177-3AD203B41FA5}">
-                      <a16:colId xmlns:a16="http://schemas.microsoft.com/office/drawing/2014/main" val="20002"/>
+                      <a16:colId xmlns:a16="http://schemas.microsoft.com/office/drawing/2014/main" xmlns="" val="20002"/>
                     </a:ext>
                   </a:extLst>
                 </a:gridCol>
                 <a:gridCol w="939356">
                   <a:extLst>
                     <a:ext uri="{9D8B030D-6E8A-4147-A177-3AD203B41FA5}">
-                      <a16:colId xmlns:a16="http://schemas.microsoft.com/office/drawing/2014/main" val="20003"/>
+                      <a16:colId xmlns:a16="http://schemas.microsoft.com/office/drawing/2014/main" xmlns="" val="20003"/>
                     </a:ext>
                   </a:extLst>
                 </a:gridCol>
@@ -24740,7 +24836,7 @@
                 </a:tc>
                 <a:extLst>
                   <a:ext uri="{0D108BD9-81ED-4DB2-BD59-A6C34878D82A}">
-                    <a16:rowId xmlns:a16="http://schemas.microsoft.com/office/drawing/2014/main" val="10000"/>
+                    <a16:rowId xmlns:a16="http://schemas.microsoft.com/office/drawing/2014/main" xmlns="" val="10000"/>
                   </a:ext>
                 </a:extLst>
               </a:tr>
@@ -24891,7 +24987,7 @@
                 </a:tc>
                 <a:extLst>
                   <a:ext uri="{0D108BD9-81ED-4DB2-BD59-A6C34878D82A}">
-                    <a16:rowId xmlns:a16="http://schemas.microsoft.com/office/drawing/2014/main" val="10001"/>
+                    <a16:rowId xmlns:a16="http://schemas.microsoft.com/office/drawing/2014/main" xmlns="" val="10001"/>
                   </a:ext>
                 </a:extLst>
               </a:tr>
@@ -25002,7 +25098,7 @@
                 </a:tc>
                 <a:extLst>
                   <a:ext uri="{0D108BD9-81ED-4DB2-BD59-A6C34878D82A}">
-                    <a16:rowId xmlns:a16="http://schemas.microsoft.com/office/drawing/2014/main" val="10002"/>
+                    <a16:rowId xmlns:a16="http://schemas.microsoft.com/office/drawing/2014/main" xmlns="" val="10002"/>
                   </a:ext>
                 </a:extLst>
               </a:tr>
@@ -25113,7 +25209,7 @@
                 </a:tc>
                 <a:extLst>
                   <a:ext uri="{0D108BD9-81ED-4DB2-BD59-A6C34878D82A}">
-                    <a16:rowId xmlns:a16="http://schemas.microsoft.com/office/drawing/2014/main" val="10003"/>
+                    <a16:rowId xmlns:a16="http://schemas.microsoft.com/office/drawing/2014/main" xmlns="" val="10003"/>
                   </a:ext>
                 </a:extLst>
               </a:tr>
@@ -25224,7 +25320,7 @@
                 </a:tc>
                 <a:extLst>
                   <a:ext uri="{0D108BD9-81ED-4DB2-BD59-A6C34878D82A}">
-                    <a16:rowId xmlns:a16="http://schemas.microsoft.com/office/drawing/2014/main" val="10004"/>
+                    <a16:rowId xmlns:a16="http://schemas.microsoft.com/office/drawing/2014/main" xmlns="" val="10004"/>
                   </a:ext>
                 </a:extLst>
               </a:tr>
@@ -25335,7 +25431,7 @@
                 </a:tc>
                 <a:extLst>
                   <a:ext uri="{0D108BD9-81ED-4DB2-BD59-A6C34878D82A}">
-                    <a16:rowId xmlns:a16="http://schemas.microsoft.com/office/drawing/2014/main" val="10005"/>
+                    <a16:rowId xmlns:a16="http://schemas.microsoft.com/office/drawing/2014/main" xmlns="" val="10005"/>
                   </a:ext>
                 </a:extLst>
               </a:tr>
@@ -25446,7 +25542,7 @@
                 </a:tc>
                 <a:extLst>
                   <a:ext uri="{0D108BD9-81ED-4DB2-BD59-A6C34878D82A}">
-                    <a16:rowId xmlns:a16="http://schemas.microsoft.com/office/drawing/2014/main" val="10006"/>
+                    <a16:rowId xmlns:a16="http://schemas.microsoft.com/office/drawing/2014/main" xmlns="" val="10006"/>
                   </a:ext>
                 </a:extLst>
               </a:tr>
@@ -25557,7 +25653,7 @@
                 </a:tc>
                 <a:extLst>
                   <a:ext uri="{0D108BD9-81ED-4DB2-BD59-A6C34878D82A}">
-                    <a16:rowId xmlns:a16="http://schemas.microsoft.com/office/drawing/2014/main" val="10007"/>
+                    <a16:rowId xmlns:a16="http://schemas.microsoft.com/office/drawing/2014/main" xmlns="" val="10007"/>
                   </a:ext>
                 </a:extLst>
               </a:tr>
@@ -25668,7 +25764,7 @@
                 </a:tc>
                 <a:extLst>
                   <a:ext uri="{0D108BD9-81ED-4DB2-BD59-A6C34878D82A}">
-                    <a16:rowId xmlns:a16="http://schemas.microsoft.com/office/drawing/2014/main" val="10008"/>
+                    <a16:rowId xmlns:a16="http://schemas.microsoft.com/office/drawing/2014/main" xmlns="" val="10008"/>
                   </a:ext>
                 </a:extLst>
               </a:tr>
@@ -25779,7 +25875,7 @@
                 </a:tc>
                 <a:extLst>
                   <a:ext uri="{0D108BD9-81ED-4DB2-BD59-A6C34878D82A}">
-                    <a16:rowId xmlns:a16="http://schemas.microsoft.com/office/drawing/2014/main" val="10009"/>
+                    <a16:rowId xmlns:a16="http://schemas.microsoft.com/office/drawing/2014/main" xmlns="" val="10009"/>
                   </a:ext>
                 </a:extLst>
               </a:tr>
@@ -25890,7 +25986,7 @@
                 </a:tc>
                 <a:extLst>
                   <a:ext uri="{0D108BD9-81ED-4DB2-BD59-A6C34878D82A}">
-                    <a16:rowId xmlns:a16="http://schemas.microsoft.com/office/drawing/2014/main" val="10010"/>
+                    <a16:rowId xmlns:a16="http://schemas.microsoft.com/office/drawing/2014/main" xmlns="" val="10010"/>
                   </a:ext>
                 </a:extLst>
               </a:tr>
@@ -26001,7 +26097,7 @@
                 </a:tc>
                 <a:extLst>
                   <a:ext uri="{0D108BD9-81ED-4DB2-BD59-A6C34878D82A}">
-                    <a16:rowId xmlns:a16="http://schemas.microsoft.com/office/drawing/2014/main" val="10011"/>
+                    <a16:rowId xmlns:a16="http://schemas.microsoft.com/office/drawing/2014/main" xmlns="" val="10011"/>
                   </a:ext>
                 </a:extLst>
               </a:tr>
@@ -26112,7 +26208,7 @@
                 </a:tc>
                 <a:extLst>
                   <a:ext uri="{0D108BD9-81ED-4DB2-BD59-A6C34878D82A}">
-                    <a16:rowId xmlns:a16="http://schemas.microsoft.com/office/drawing/2014/main" val="10012"/>
+                    <a16:rowId xmlns:a16="http://schemas.microsoft.com/office/drawing/2014/main" xmlns="" val="10012"/>
                   </a:ext>
                 </a:extLst>
               </a:tr>
@@ -26223,7 +26319,7 @@
                 </a:tc>
                 <a:extLst>
                   <a:ext uri="{0D108BD9-81ED-4DB2-BD59-A6C34878D82A}">
-                    <a16:rowId xmlns:a16="http://schemas.microsoft.com/office/drawing/2014/main" val="10013"/>
+                    <a16:rowId xmlns:a16="http://schemas.microsoft.com/office/drawing/2014/main" xmlns="" val="10013"/>
                   </a:ext>
                 </a:extLst>
               </a:tr>
@@ -26334,7 +26430,7 @@
                 </a:tc>
                 <a:extLst>
                   <a:ext uri="{0D108BD9-81ED-4DB2-BD59-A6C34878D82A}">
-                    <a16:rowId xmlns:a16="http://schemas.microsoft.com/office/drawing/2014/main" val="10014"/>
+                    <a16:rowId xmlns:a16="http://schemas.microsoft.com/office/drawing/2014/main" xmlns="" val="10014"/>
                   </a:ext>
                 </a:extLst>
               </a:tr>
@@ -26445,7 +26541,7 @@
                 </a:tc>
                 <a:extLst>
                   <a:ext uri="{0D108BD9-81ED-4DB2-BD59-A6C34878D82A}">
-                    <a16:rowId xmlns:a16="http://schemas.microsoft.com/office/drawing/2014/main" val="10015"/>
+                    <a16:rowId xmlns:a16="http://schemas.microsoft.com/office/drawing/2014/main" xmlns="" val="10015"/>
                   </a:ext>
                 </a:extLst>
               </a:tr>
@@ -26556,7 +26652,7 @@
                 </a:tc>
                 <a:extLst>
                   <a:ext uri="{0D108BD9-81ED-4DB2-BD59-A6C34878D82A}">
-                    <a16:rowId xmlns:a16="http://schemas.microsoft.com/office/drawing/2014/main" val="10016"/>
+                    <a16:rowId xmlns:a16="http://schemas.microsoft.com/office/drawing/2014/main" xmlns="" val="10016"/>
                   </a:ext>
                 </a:extLst>
               </a:tr>
@@ -26667,7 +26763,7 @@
                 </a:tc>
                 <a:extLst>
                   <a:ext uri="{0D108BD9-81ED-4DB2-BD59-A6C34878D82A}">
-                    <a16:rowId xmlns:a16="http://schemas.microsoft.com/office/drawing/2014/main" val="10017"/>
+                    <a16:rowId xmlns:a16="http://schemas.microsoft.com/office/drawing/2014/main" xmlns="" val="10017"/>
                   </a:ext>
                 </a:extLst>
               </a:tr>
@@ -26818,7 +26914,7 @@
                 </a:tc>
                 <a:extLst>
                   <a:ext uri="{0D108BD9-81ED-4DB2-BD59-A6C34878D82A}">
-                    <a16:rowId xmlns:a16="http://schemas.microsoft.com/office/drawing/2014/main" val="10018"/>
+                    <a16:rowId xmlns:a16="http://schemas.microsoft.com/office/drawing/2014/main" xmlns="" val="10018"/>
                   </a:ext>
                 </a:extLst>
               </a:tr>
@@ -29164,7 +29260,7 @@
                 <a:gridCol w="7257143">
                   <a:extLst>
                     <a:ext uri="{9D8B030D-6E8A-4147-A177-3AD203B41FA5}">
-                      <a16:colId xmlns:a16="http://schemas.microsoft.com/office/drawing/2014/main" val="20000"/>
+                      <a16:colId xmlns:a16="http://schemas.microsoft.com/office/drawing/2014/main" xmlns="" val="20000"/>
                     </a:ext>
                   </a:extLst>
                 </a:gridCol>
@@ -29189,7 +29285,7 @@
                 </a:tc>
                 <a:extLst>
                   <a:ext uri="{0D108BD9-81ED-4DB2-BD59-A6C34878D82A}">
-                    <a16:rowId xmlns:a16="http://schemas.microsoft.com/office/drawing/2014/main" val="10000"/>
+                    <a16:rowId xmlns:a16="http://schemas.microsoft.com/office/drawing/2014/main" xmlns="" val="10000"/>
                   </a:ext>
                 </a:extLst>
               </a:tr>
@@ -29213,7 +29309,7 @@
                 </a:tc>
                 <a:extLst>
                   <a:ext uri="{0D108BD9-81ED-4DB2-BD59-A6C34878D82A}">
-                    <a16:rowId xmlns:a16="http://schemas.microsoft.com/office/drawing/2014/main" val="10001"/>
+                    <a16:rowId xmlns:a16="http://schemas.microsoft.com/office/drawing/2014/main" xmlns="" val="10001"/>
                   </a:ext>
                 </a:extLst>
               </a:tr>
@@ -29982,7 +30078,7 @@
                 <a:gridCol w="5348379">
                   <a:extLst>
                     <a:ext uri="{9D8B030D-6E8A-4147-A177-3AD203B41FA5}">
-                      <a16:colId xmlns:a16="http://schemas.microsoft.com/office/drawing/2014/main" val="20000"/>
+                      <a16:colId xmlns:a16="http://schemas.microsoft.com/office/drawing/2014/main" xmlns="" val="20000"/>
                     </a:ext>
                   </a:extLst>
                 </a:gridCol>
@@ -30007,7 +30103,7 @@
                 </a:tc>
                 <a:extLst>
                   <a:ext uri="{0D108BD9-81ED-4DB2-BD59-A6C34878D82A}">
-                    <a16:rowId xmlns:a16="http://schemas.microsoft.com/office/drawing/2014/main" val="10000"/>
+                    <a16:rowId xmlns:a16="http://schemas.microsoft.com/office/drawing/2014/main" xmlns="" val="10000"/>
                   </a:ext>
                 </a:extLst>
               </a:tr>
@@ -30031,7 +30127,7 @@
                 </a:tc>
                 <a:extLst>
                   <a:ext uri="{0D108BD9-81ED-4DB2-BD59-A6C34878D82A}">
-                    <a16:rowId xmlns:a16="http://schemas.microsoft.com/office/drawing/2014/main" val="10001"/>
+                    <a16:rowId xmlns:a16="http://schemas.microsoft.com/office/drawing/2014/main" xmlns="" val="10001"/>
                   </a:ext>
                 </a:extLst>
               </a:tr>
@@ -31354,7 +31450,7 @@
                 <a:gridCol w="7508581">
                   <a:extLst>
                     <a:ext uri="{9D8B030D-6E8A-4147-A177-3AD203B41FA5}">
-                      <a16:colId xmlns:a16="http://schemas.microsoft.com/office/drawing/2014/main" val="20000"/>
+                      <a16:colId xmlns:a16="http://schemas.microsoft.com/office/drawing/2014/main" xmlns="" val="20000"/>
                     </a:ext>
                   </a:extLst>
                 </a:gridCol>
@@ -31379,7 +31475,7 @@
                 </a:tc>
                 <a:extLst>
                   <a:ext uri="{0D108BD9-81ED-4DB2-BD59-A6C34878D82A}">
-                    <a16:rowId xmlns:a16="http://schemas.microsoft.com/office/drawing/2014/main" val="10000"/>
+                    <a16:rowId xmlns:a16="http://schemas.microsoft.com/office/drawing/2014/main" xmlns="" val="10000"/>
                   </a:ext>
                 </a:extLst>
               </a:tr>
@@ -31403,7 +31499,7 @@
                 </a:tc>
                 <a:extLst>
                   <a:ext uri="{0D108BD9-81ED-4DB2-BD59-A6C34878D82A}">
-                    <a16:rowId xmlns:a16="http://schemas.microsoft.com/office/drawing/2014/main" val="10001"/>
+                    <a16:rowId xmlns:a16="http://schemas.microsoft.com/office/drawing/2014/main" xmlns="" val="10001"/>
                   </a:ext>
                 </a:extLst>
               </a:tr>
@@ -31420,14 +31516,14 @@
           <p:nvPr>
             <p:extLst>
               <p:ext uri="{D42A27DB-BD31-4B8C-83A1-F6EECF244321}">
-                <p14:modId xmlns:p14="http://schemas.microsoft.com/office/powerpoint/2010/main" val="1815563491"/>
+                <p14:modId xmlns:p14="http://schemas.microsoft.com/office/powerpoint/2010/main" val="3713492921"/>
               </p:ext>
             </p:extLst>
           </p:nvPr>
         </p:nvGraphicFramePr>
         <p:xfrm>
           <a:off x="2650210" y="8313568"/>
-          <a:ext cx="7519265" cy="2468880"/>
+          <a:ext cx="7519265" cy="2800998"/>
         </p:xfrm>
         <a:graphic>
           <a:graphicData uri="http://schemas.openxmlformats.org/drawingml/2006/table">
@@ -31439,7 +31535,7 @@
                 <a:gridCol w="7519265">
                   <a:extLst>
                     <a:ext uri="{9D8B030D-6E8A-4147-A177-3AD203B41FA5}">
-                      <a16:colId xmlns:a16="http://schemas.microsoft.com/office/drawing/2014/main" val="20000"/>
+                      <a16:colId xmlns:a16="http://schemas.microsoft.com/office/drawing/2014/main" xmlns="" val="20000"/>
                     </a:ext>
                   </a:extLst>
                 </a:gridCol>
@@ -31464,11 +31560,11 @@
                 </a:tc>
                 <a:extLst>
                   <a:ext uri="{0D108BD9-81ED-4DB2-BD59-A6C34878D82A}">
-                    <a16:rowId xmlns:a16="http://schemas.microsoft.com/office/drawing/2014/main" val="10000"/>
+                    <a16:rowId xmlns:a16="http://schemas.microsoft.com/office/drawing/2014/main" xmlns="" val="10000"/>
                   </a:ext>
                 </a:extLst>
               </a:tr>
-              <a:tr h="927882">
+              <a:tr h="1260000">
                 <a:tc>
                   <a:txBody>
                     <a:bodyPr/>
@@ -31488,7 +31584,7 @@
                 </a:tc>
                 <a:extLst>
                   <a:ext uri="{0D108BD9-81ED-4DB2-BD59-A6C34878D82A}">
-                    <a16:rowId xmlns:a16="http://schemas.microsoft.com/office/drawing/2014/main" val="10001"/>
+                    <a16:rowId xmlns:a16="http://schemas.microsoft.com/office/drawing/2014/main" xmlns="" val="10001"/>
                   </a:ext>
                 </a:extLst>
               </a:tr>
@@ -32060,729 +32156,6 @@
       </p:cxnSp>
       <p:sp>
         <p:nvSpPr>
-          <p:cNvPr id="26" name="직사각형 25"/>
-          <p:cNvSpPr/>
-          <p:nvPr/>
-        </p:nvSpPr>
-        <p:spPr>
-          <a:xfrm>
-            <a:off x="2650210" y="3211825"/>
-            <a:ext cx="2652788" cy="307777"/>
-          </a:xfrm>
-          <a:prstGeom prst="rect">
-            <a:avLst/>
-          </a:prstGeom>
-        </p:spPr>
-        <p:txBody>
-          <a:bodyPr wrap="square">
-            <a:spAutoFit/>
-          </a:bodyPr>
-          <a:lstStyle/>
-          <a:p>
-            <a:pPr algn="r"/>
-            <a:r>
-              <a:rPr lang="en-US" altLang="ko-KR" sz="1400" b="1" dirty="0" smtClean="0">
-                <a:latin typeface="Helvetica" panose="020B0604020202030204" pitchFamily="34" charset="0"/>
-                <a:cs typeface="Arial" panose="020B0604020202020204" pitchFamily="34" charset="0"/>
-              </a:rPr>
-              <a:t>Missing genotype rate &gt; 0.05</a:t>
-            </a:r>
-            <a:endParaRPr lang="ko-KR" altLang="en-US" sz="1400" b="1" dirty="0">
-              <a:latin typeface="Helvetica" panose="020B0604020202030204" pitchFamily="34" charset="0"/>
-              <a:cs typeface="Arial" panose="020B0604020202020204" pitchFamily="34" charset="0"/>
-            </a:endParaRPr>
-          </a:p>
-        </p:txBody>
-      </p:sp>
-      <p:sp>
-        <p:nvSpPr>
-          <p:cNvPr id="58" name="직사각형 57"/>
-          <p:cNvSpPr/>
-          <p:nvPr/>
-        </p:nvSpPr>
-        <p:spPr>
-          <a:xfrm>
-            <a:off x="6199637" y="3210702"/>
-            <a:ext cx="1647371" cy="307777"/>
-          </a:xfrm>
-          <a:prstGeom prst="rect">
-            <a:avLst/>
-          </a:prstGeom>
-        </p:spPr>
-        <p:txBody>
-          <a:bodyPr wrap="square">
-            <a:spAutoFit/>
-          </a:bodyPr>
-          <a:lstStyle/>
-          <a:p>
-            <a:r>
-              <a:rPr lang="en-US" altLang="ko-KR" sz="1400" dirty="0" smtClean="0">
-                <a:latin typeface="Helvetica" panose="020B0604020202030204" pitchFamily="34" charset="0"/>
-                <a:cs typeface="Arial" panose="020B0604020202020204" pitchFamily="34" charset="0"/>
-              </a:rPr>
-              <a:t>- 11,702 SNPs</a:t>
-            </a:r>
-            <a:endParaRPr lang="ko-KR" altLang="en-US" sz="1400" dirty="0">
-              <a:latin typeface="Helvetica" panose="020B0604020202030204" pitchFamily="34" charset="0"/>
-              <a:cs typeface="Arial" panose="020B0604020202020204" pitchFamily="34" charset="0"/>
-            </a:endParaRPr>
-          </a:p>
-        </p:txBody>
-      </p:sp>
-      <p:sp>
-        <p:nvSpPr>
-          <p:cNvPr id="61" name="직사각형 60"/>
-          <p:cNvSpPr/>
-          <p:nvPr/>
-        </p:nvSpPr>
-        <p:spPr>
-          <a:xfrm>
-            <a:off x="8779168" y="3210701"/>
-            <a:ext cx="994981" cy="307777"/>
-          </a:xfrm>
-          <a:prstGeom prst="rect">
-            <a:avLst/>
-          </a:prstGeom>
-        </p:spPr>
-        <p:txBody>
-          <a:bodyPr>
-            <a:spAutoFit/>
-          </a:bodyPr>
-          <a:lstStyle/>
-          <a:p>
-            <a:r>
-              <a:rPr lang="en-US" altLang="ko-KR" sz="1400" dirty="0" smtClean="0">
-                <a:latin typeface="Helvetica" panose="020B0604020202030204" pitchFamily="34" charset="0"/>
-                <a:cs typeface="Arial" panose="020B0604020202020204" pitchFamily="34" charset="0"/>
-              </a:rPr>
-              <a:t>- 40 SNPs</a:t>
-            </a:r>
-            <a:endParaRPr lang="ko-KR" altLang="en-US" sz="1400" dirty="0">
-              <a:latin typeface="Helvetica" panose="020B0604020202030204" pitchFamily="34" charset="0"/>
-              <a:cs typeface="Arial" panose="020B0604020202020204" pitchFamily="34" charset="0"/>
-            </a:endParaRPr>
-          </a:p>
-        </p:txBody>
-      </p:sp>
-      <mc:AlternateContent xmlns:mc="http://schemas.openxmlformats.org/markup-compatibility/2006" xmlns:a14="http://schemas.microsoft.com/office/drawing/2010/main">
-        <mc:Choice Requires="a14">
-          <p:sp>
-            <p:nvSpPr>
-              <p:cNvPr id="62" name="직사각형 61"/>
-              <p:cNvSpPr/>
-              <p:nvPr/>
-            </p:nvSpPr>
-            <p:spPr>
-              <a:xfrm>
-                <a:off x="2876626" y="3499335"/>
-                <a:ext cx="2394097" cy="307777"/>
-              </a:xfrm>
-              <a:prstGeom prst="rect">
-                <a:avLst/>
-              </a:prstGeom>
-            </p:spPr>
-            <p:txBody>
-              <a:bodyPr wrap="square">
-                <a:spAutoFit/>
-              </a:bodyPr>
-              <a:lstStyle/>
-              <a:p>
-                <a:pPr algn="r"/>
-                <a:r>
-                  <a:rPr lang="en-US" altLang="ko-KR" sz="1400" b="1" dirty="0" smtClean="0">
-                    <a:latin typeface="Helvetica" panose="020B0604020202030204" pitchFamily="34" charset="0"/>
-                    <a:cs typeface="Arial" panose="020B0604020202020204" pitchFamily="34" charset="0"/>
-                  </a:rPr>
-                  <a:t>P-value of HWE &lt; 1</a:t>
-                </a:r>
-                <a14:m>
-                  <m:oMath xmlns:m="http://schemas.openxmlformats.org/officeDocument/2006/math">
-                    <m:r>
-                      <a:rPr lang="en-US" altLang="ko-KR" sz="1400" b="1" i="1" smtClean="0">
-                        <a:latin typeface="Cambria Math"/>
-                      </a:rPr>
-                      <m:t>×</m:t>
-                    </m:r>
-                  </m:oMath>
-                </a14:m>
-                <a:r>
-                  <a:rPr lang="en-US" altLang="ko-KR" sz="1400" b="1" dirty="0" smtClean="0">
-                    <a:latin typeface="Helvetica" panose="020B0604020202030204" pitchFamily="34" charset="0"/>
-                    <a:cs typeface="Arial" panose="020B0604020202020204" pitchFamily="34" charset="0"/>
-                  </a:rPr>
-                  <a:t>10</a:t>
-                </a:r>
-                <a:r>
-                  <a:rPr lang="en-US" altLang="ko-KR" sz="1400" b="1" baseline="30000" dirty="0" smtClean="0">
-                    <a:latin typeface="Helvetica" panose="020B0604020202030204" pitchFamily="34" charset="0"/>
-                    <a:cs typeface="Arial" panose="020B0604020202020204" pitchFamily="34" charset="0"/>
-                  </a:rPr>
-                  <a:t>-5</a:t>
-                </a:r>
-                <a:endParaRPr lang="ko-KR" altLang="en-US" sz="1400" b="1" dirty="0">
-                  <a:latin typeface="Helvetica" panose="020B0604020202030204" pitchFamily="34" charset="0"/>
-                  <a:cs typeface="Arial" panose="020B0604020202020204" pitchFamily="34" charset="0"/>
-                </a:endParaRPr>
-              </a:p>
-            </p:txBody>
-          </p:sp>
-        </mc:Choice>
-        <mc:Fallback xmlns="">
-          <p:sp>
-            <p:nvSpPr>
-              <p:cNvPr id="62" name="직사각형 61"/>
-              <p:cNvSpPr>
-                <a:spLocks noRot="1" noChangeAspect="1" noMove="1" noResize="1" noEditPoints="1" noAdjustHandles="1" noChangeArrowheads="1" noChangeShapeType="1" noTextEdit="1"/>
-              </p:cNvSpPr>
-              <p:nvPr/>
-            </p:nvSpPr>
-            <p:spPr>
-              <a:xfrm>
-                <a:off x="2876626" y="3499335"/>
-                <a:ext cx="2394097" cy="307777"/>
-              </a:xfrm>
-              <a:prstGeom prst="rect">
-                <a:avLst/>
-              </a:prstGeom>
-              <a:blipFill rotWithShape="0">
-                <a:blip r:embed="rId2"/>
-                <a:stretch>
-                  <a:fillRect t="-3922" b="-19608"/>
-                </a:stretch>
-              </a:blipFill>
-            </p:spPr>
-            <p:txBody>
-              <a:bodyPr/>
-              <a:lstStyle/>
-              <a:p>
-                <a:r>
-                  <a:rPr lang="ko-KR" altLang="en-US">
-                    <a:noFill/>
-                  </a:rPr>
-                  <a:t> </a:t>
-                </a:r>
-              </a:p>
-            </p:txBody>
-          </p:sp>
-        </mc:Fallback>
-      </mc:AlternateContent>
-      <p:sp>
-        <p:nvSpPr>
-          <p:cNvPr id="63" name="직사각형 62"/>
-          <p:cNvSpPr/>
-          <p:nvPr/>
-        </p:nvSpPr>
-        <p:spPr>
-          <a:xfrm>
-            <a:off x="6199637" y="3499334"/>
-            <a:ext cx="1390126" cy="307777"/>
-          </a:xfrm>
-          <a:prstGeom prst="rect">
-            <a:avLst/>
-          </a:prstGeom>
-        </p:spPr>
-        <p:txBody>
-          <a:bodyPr wrap="square">
-            <a:spAutoFit/>
-          </a:bodyPr>
-          <a:lstStyle/>
-          <a:p>
-            <a:r>
-              <a:rPr lang="en-US" altLang="ko-KR" sz="1400" dirty="0" smtClean="0">
-                <a:latin typeface="Helvetica" panose="020B0604020202030204" pitchFamily="34" charset="0"/>
-                <a:cs typeface="Arial" panose="020B0604020202020204" pitchFamily="34" charset="0"/>
-              </a:rPr>
-              <a:t>- 142 SNPs</a:t>
-            </a:r>
-            <a:endParaRPr lang="ko-KR" altLang="en-US" sz="1400" dirty="0">
-              <a:latin typeface="Helvetica" panose="020B0604020202030204" pitchFamily="34" charset="0"/>
-              <a:cs typeface="Arial" panose="020B0604020202020204" pitchFamily="34" charset="0"/>
-            </a:endParaRPr>
-          </a:p>
-        </p:txBody>
-      </p:sp>
-      <p:sp>
-        <p:nvSpPr>
-          <p:cNvPr id="64" name="직사각형 63"/>
-          <p:cNvSpPr/>
-          <p:nvPr/>
-        </p:nvSpPr>
-        <p:spPr>
-          <a:xfrm>
-            <a:off x="8779168" y="3499333"/>
-            <a:ext cx="994981" cy="307777"/>
-          </a:xfrm>
-          <a:prstGeom prst="rect">
-            <a:avLst/>
-          </a:prstGeom>
-        </p:spPr>
-        <p:txBody>
-          <a:bodyPr>
-            <a:spAutoFit/>
-          </a:bodyPr>
-          <a:lstStyle/>
-          <a:p>
-            <a:r>
-              <a:rPr lang="en-US" altLang="ko-KR" sz="1400" dirty="0">
-                <a:latin typeface="Helvetica" panose="020B0604020202030204" pitchFamily="34" charset="0"/>
-                <a:cs typeface="Arial" panose="020B0604020202020204" pitchFamily="34" charset="0"/>
-              </a:rPr>
-              <a:t>- 39 SNPs</a:t>
-            </a:r>
-            <a:endParaRPr lang="ko-KR" altLang="en-US" sz="1400" dirty="0">
-              <a:latin typeface="Helvetica" panose="020B0604020202030204" pitchFamily="34" charset="0"/>
-              <a:cs typeface="Arial" panose="020B0604020202020204" pitchFamily="34" charset="0"/>
-            </a:endParaRPr>
-          </a:p>
-        </p:txBody>
-      </p:sp>
-      <p:sp>
-        <p:nvSpPr>
-          <p:cNvPr id="66" name="직사각형 65"/>
-          <p:cNvSpPr/>
-          <p:nvPr/>
-        </p:nvSpPr>
-        <p:spPr>
-          <a:xfrm>
-            <a:off x="3668296" y="3785344"/>
-            <a:ext cx="1602427" cy="307777"/>
-          </a:xfrm>
-          <a:prstGeom prst="rect">
-            <a:avLst/>
-          </a:prstGeom>
-        </p:spPr>
-        <p:txBody>
-          <a:bodyPr>
-            <a:spAutoFit/>
-          </a:bodyPr>
-          <a:lstStyle/>
-          <a:p>
-            <a:pPr algn="r"/>
-            <a:r>
-              <a:rPr lang="en-US" altLang="ko-KR" sz="1400" b="1" dirty="0" smtClean="0">
-                <a:latin typeface="Helvetica" panose="020B0604020202030204" pitchFamily="34" charset="0"/>
-                <a:cs typeface="Arial" panose="020B0604020202020204" pitchFamily="34" charset="0"/>
-              </a:rPr>
-              <a:t>MAF &lt; 0.05</a:t>
-            </a:r>
-            <a:endParaRPr lang="ko-KR" altLang="en-US" sz="1400" b="1" dirty="0">
-              <a:latin typeface="Helvetica" panose="020B0604020202030204" pitchFamily="34" charset="0"/>
-              <a:cs typeface="Arial" panose="020B0604020202020204" pitchFamily="34" charset="0"/>
-            </a:endParaRPr>
-          </a:p>
-        </p:txBody>
-      </p:sp>
-      <p:sp>
-        <p:nvSpPr>
-          <p:cNvPr id="67" name="직사각형 66"/>
-          <p:cNvSpPr/>
-          <p:nvPr/>
-        </p:nvSpPr>
-        <p:spPr>
-          <a:xfrm>
-            <a:off x="6199637" y="3785343"/>
-            <a:ext cx="1390126" cy="307777"/>
-          </a:xfrm>
-          <a:prstGeom prst="rect">
-            <a:avLst/>
-          </a:prstGeom>
-        </p:spPr>
-        <p:txBody>
-          <a:bodyPr wrap="square">
-            <a:spAutoFit/>
-          </a:bodyPr>
-          <a:lstStyle/>
-          <a:p>
-            <a:r>
-              <a:rPr lang="en-US" altLang="ko-KR" sz="1400" dirty="0" smtClean="0">
-                <a:latin typeface="Helvetica" panose="020B0604020202030204" pitchFamily="34" charset="0"/>
-                <a:cs typeface="Arial" panose="020B0604020202020204" pitchFamily="34" charset="0"/>
-              </a:rPr>
-              <a:t>- 41,838 SNPs</a:t>
-            </a:r>
-            <a:endParaRPr lang="ko-KR" altLang="en-US" sz="1400" dirty="0">
-              <a:latin typeface="Helvetica" panose="020B0604020202030204" pitchFamily="34" charset="0"/>
-              <a:cs typeface="Arial" panose="020B0604020202020204" pitchFamily="34" charset="0"/>
-            </a:endParaRPr>
-          </a:p>
-        </p:txBody>
-      </p:sp>
-      <p:sp>
-        <p:nvSpPr>
-          <p:cNvPr id="68" name="직사각형 67"/>
-          <p:cNvSpPr/>
-          <p:nvPr/>
-        </p:nvSpPr>
-        <p:spPr>
-          <a:xfrm>
-            <a:off x="8779168" y="3785342"/>
-            <a:ext cx="1379623" cy="307777"/>
-          </a:xfrm>
-          <a:prstGeom prst="rect">
-            <a:avLst/>
-          </a:prstGeom>
-        </p:spPr>
-        <p:txBody>
-          <a:bodyPr wrap="square">
-            <a:spAutoFit/>
-          </a:bodyPr>
-          <a:lstStyle/>
-          <a:p>
-            <a:r>
-              <a:rPr lang="en-US" altLang="ko-KR" sz="1400" dirty="0">
-                <a:latin typeface="Helvetica" panose="020B0604020202030204" pitchFamily="34" charset="0"/>
-                <a:cs typeface="Arial" panose="020B0604020202020204" pitchFamily="34" charset="0"/>
-              </a:rPr>
-              <a:t>- 45,009 SNPs</a:t>
-            </a:r>
-            <a:endParaRPr lang="ko-KR" altLang="en-US" sz="1400" dirty="0">
-              <a:latin typeface="Helvetica" panose="020B0604020202030204" pitchFamily="34" charset="0"/>
-              <a:cs typeface="Arial" panose="020B0604020202020204" pitchFamily="34" charset="0"/>
-            </a:endParaRPr>
-          </a:p>
-        </p:txBody>
-      </p:sp>
-      <p:sp>
-        <p:nvSpPr>
-          <p:cNvPr id="70" name="직사각형 69"/>
-          <p:cNvSpPr/>
-          <p:nvPr/>
-        </p:nvSpPr>
-        <p:spPr>
-          <a:xfrm>
-            <a:off x="2650210" y="4781554"/>
-            <a:ext cx="2618149" cy="307777"/>
-          </a:xfrm>
-          <a:prstGeom prst="rect">
-            <a:avLst/>
-          </a:prstGeom>
-        </p:spPr>
-        <p:txBody>
-          <a:bodyPr wrap="square">
-            <a:spAutoFit/>
-          </a:bodyPr>
-          <a:lstStyle/>
-          <a:p>
-            <a:pPr algn="r"/>
-            <a:r>
-              <a:rPr lang="en-US" altLang="ko-KR" sz="1400" b="1" dirty="0">
-                <a:latin typeface="Helvetica" panose="020B0604020202030204" pitchFamily="34" charset="0"/>
-                <a:cs typeface="Arial" panose="020B0604020202020204" pitchFamily="34" charset="0"/>
-              </a:rPr>
-              <a:t>Missing genotype rate &gt; </a:t>
-            </a:r>
-            <a:r>
-              <a:rPr lang="en-US" altLang="ko-KR" sz="1400" b="1" dirty="0" smtClean="0">
-                <a:latin typeface="Helvetica" panose="020B0604020202030204" pitchFamily="34" charset="0"/>
-                <a:cs typeface="Arial" panose="020B0604020202020204" pitchFamily="34" charset="0"/>
-              </a:rPr>
-              <a:t>0.05</a:t>
-            </a:r>
-            <a:endParaRPr lang="ko-KR" altLang="en-US" sz="1400" b="1" dirty="0">
-              <a:latin typeface="Helvetica" panose="020B0604020202030204" pitchFamily="34" charset="0"/>
-              <a:cs typeface="Arial" panose="020B0604020202020204" pitchFamily="34" charset="0"/>
-            </a:endParaRPr>
-          </a:p>
-        </p:txBody>
-      </p:sp>
-      <p:sp>
-        <p:nvSpPr>
-          <p:cNvPr id="71" name="직사각형 70"/>
-          <p:cNvSpPr/>
-          <p:nvPr/>
-        </p:nvSpPr>
-        <p:spPr>
-          <a:xfrm>
-            <a:off x="6199637" y="4781553"/>
-            <a:ext cx="1390126" cy="307777"/>
-          </a:xfrm>
-          <a:prstGeom prst="rect">
-            <a:avLst/>
-          </a:prstGeom>
-        </p:spPr>
-        <p:txBody>
-          <a:bodyPr wrap="square">
-            <a:spAutoFit/>
-          </a:bodyPr>
-          <a:lstStyle/>
-          <a:p>
-            <a:r>
-              <a:rPr lang="en-US" altLang="ko-KR" sz="1400" dirty="0" smtClean="0">
-                <a:latin typeface="Helvetica" panose="020B0604020202030204" pitchFamily="34" charset="0"/>
-                <a:cs typeface="Arial" panose="020B0604020202020204" pitchFamily="34" charset="0"/>
-              </a:rPr>
-              <a:t>- 12 subjects</a:t>
-            </a:r>
-            <a:endParaRPr lang="ko-KR" altLang="en-US" sz="1400" dirty="0">
-              <a:latin typeface="Helvetica" panose="020B0604020202030204" pitchFamily="34" charset="0"/>
-              <a:cs typeface="Arial" panose="020B0604020202020204" pitchFamily="34" charset="0"/>
-            </a:endParaRPr>
-          </a:p>
-        </p:txBody>
-      </p:sp>
-      <p:sp>
-        <p:nvSpPr>
-          <p:cNvPr id="72" name="직사각형 71"/>
-          <p:cNvSpPr/>
-          <p:nvPr/>
-        </p:nvSpPr>
-        <p:spPr>
-          <a:xfrm>
-            <a:off x="8779168" y="4781552"/>
-            <a:ext cx="1379623" cy="307777"/>
-          </a:xfrm>
-          <a:prstGeom prst="rect">
-            <a:avLst/>
-          </a:prstGeom>
-        </p:spPr>
-        <p:txBody>
-          <a:bodyPr wrap="square">
-            <a:spAutoFit/>
-          </a:bodyPr>
-          <a:lstStyle/>
-          <a:p>
-            <a:r>
-              <a:rPr lang="en-US" altLang="ko-KR" sz="1400" dirty="0">
-                <a:latin typeface="Helvetica" panose="020B0604020202030204" pitchFamily="34" charset="0"/>
-                <a:cs typeface="Arial" panose="020B0604020202020204" pitchFamily="34" charset="0"/>
-              </a:rPr>
-              <a:t>- 0 </a:t>
-            </a:r>
-            <a:r>
-              <a:rPr lang="en-US" altLang="ko-KR" sz="1400" dirty="0" smtClean="0">
-                <a:latin typeface="Helvetica" panose="020B0604020202030204" pitchFamily="34" charset="0"/>
-                <a:cs typeface="Arial" panose="020B0604020202020204" pitchFamily="34" charset="0"/>
-              </a:rPr>
-              <a:t>subjects</a:t>
-            </a:r>
-            <a:endParaRPr lang="ko-KR" altLang="en-US" sz="1400" dirty="0">
-              <a:latin typeface="Helvetica" panose="020B0604020202030204" pitchFamily="34" charset="0"/>
-              <a:cs typeface="Arial" panose="020B0604020202020204" pitchFamily="34" charset="0"/>
-            </a:endParaRPr>
-          </a:p>
-        </p:txBody>
-      </p:sp>
-      <p:sp>
-        <p:nvSpPr>
-          <p:cNvPr id="78" name="직사각형 77"/>
-          <p:cNvSpPr/>
-          <p:nvPr/>
-        </p:nvSpPr>
-        <p:spPr>
-          <a:xfrm>
-            <a:off x="2919408" y="5056776"/>
-            <a:ext cx="2351315" cy="307777"/>
-          </a:xfrm>
-          <a:prstGeom prst="rect">
-            <a:avLst/>
-          </a:prstGeom>
-        </p:spPr>
-        <p:txBody>
-          <a:bodyPr wrap="square">
-            <a:spAutoFit/>
-          </a:bodyPr>
-          <a:lstStyle/>
-          <a:p>
-            <a:pPr algn="r"/>
-            <a:r>
-              <a:rPr lang="en-US" altLang="ko-KR" sz="1400" b="1" dirty="0" smtClean="0">
-                <a:latin typeface="Helvetica" panose="020B0604020202030204" pitchFamily="34" charset="0"/>
-                <a:cs typeface="Arial" panose="020B0604020202020204" pitchFamily="34" charset="0"/>
-              </a:rPr>
-              <a:t>IBS &gt; 0.8</a:t>
-            </a:r>
-            <a:endParaRPr lang="ko-KR" altLang="en-US" sz="1400" b="1" dirty="0">
-              <a:latin typeface="Helvetica" panose="020B0604020202030204" pitchFamily="34" charset="0"/>
-              <a:cs typeface="Arial" panose="020B0604020202020204" pitchFamily="34" charset="0"/>
-            </a:endParaRPr>
-          </a:p>
-        </p:txBody>
-      </p:sp>
-      <p:sp>
-        <p:nvSpPr>
-          <p:cNvPr id="79" name="직사각형 78"/>
-          <p:cNvSpPr/>
-          <p:nvPr/>
-        </p:nvSpPr>
-        <p:spPr>
-          <a:xfrm>
-            <a:off x="6199637" y="5056774"/>
-            <a:ext cx="1491726" cy="307777"/>
-          </a:xfrm>
-          <a:prstGeom prst="rect">
-            <a:avLst/>
-          </a:prstGeom>
-        </p:spPr>
-        <p:txBody>
-          <a:bodyPr wrap="square">
-            <a:spAutoFit/>
-          </a:bodyPr>
-          <a:lstStyle/>
-          <a:p>
-            <a:r>
-              <a:rPr lang="en-US" altLang="ko-KR" sz="1400" dirty="0" smtClean="0">
-                <a:latin typeface="Helvetica" panose="020B0604020202030204" pitchFamily="34" charset="0"/>
-                <a:cs typeface="Arial" panose="020B0604020202020204" pitchFamily="34" charset="0"/>
-              </a:rPr>
-              <a:t>- 4 subjects</a:t>
-            </a:r>
-            <a:endParaRPr lang="ko-KR" altLang="en-US" sz="1400" dirty="0">
-              <a:latin typeface="Helvetica" panose="020B0604020202030204" pitchFamily="34" charset="0"/>
-              <a:cs typeface="Arial" panose="020B0604020202020204" pitchFamily="34" charset="0"/>
-            </a:endParaRPr>
-          </a:p>
-        </p:txBody>
-      </p:sp>
-      <p:sp>
-        <p:nvSpPr>
-          <p:cNvPr id="80" name="직사각형 79"/>
-          <p:cNvSpPr/>
-          <p:nvPr/>
-        </p:nvSpPr>
-        <p:spPr>
-          <a:xfrm>
-            <a:off x="8779168" y="5056773"/>
-            <a:ext cx="1248995" cy="307777"/>
-          </a:xfrm>
-          <a:prstGeom prst="rect">
-            <a:avLst/>
-          </a:prstGeom>
-        </p:spPr>
-        <p:txBody>
-          <a:bodyPr wrap="square">
-            <a:spAutoFit/>
-          </a:bodyPr>
-          <a:lstStyle/>
-          <a:p>
-            <a:r>
-              <a:rPr lang="en-US" altLang="ko-KR" sz="1400" dirty="0">
-                <a:latin typeface="Helvetica" panose="020B0604020202030204" pitchFamily="34" charset="0"/>
-                <a:cs typeface="Arial" panose="020B0604020202020204" pitchFamily="34" charset="0"/>
-              </a:rPr>
-              <a:t>- 0 subjects</a:t>
-            </a:r>
-            <a:endParaRPr lang="ko-KR" altLang="en-US" sz="1400" dirty="0">
-              <a:latin typeface="Helvetica" panose="020B0604020202030204" pitchFamily="34" charset="0"/>
-              <a:cs typeface="Arial" panose="020B0604020202020204" pitchFamily="34" charset="0"/>
-            </a:endParaRPr>
-          </a:p>
-        </p:txBody>
-      </p:sp>
-      <p:sp>
-        <p:nvSpPr>
-          <p:cNvPr id="86" name="직사각형 85"/>
-          <p:cNvSpPr/>
-          <p:nvPr/>
-        </p:nvSpPr>
-        <p:spPr>
-          <a:xfrm>
-            <a:off x="2887134" y="4502415"/>
-            <a:ext cx="2383590" cy="307777"/>
-          </a:xfrm>
-          <a:prstGeom prst="rect">
-            <a:avLst/>
-          </a:prstGeom>
-        </p:spPr>
-        <p:txBody>
-          <a:bodyPr wrap="square">
-            <a:spAutoFit/>
-          </a:bodyPr>
-          <a:lstStyle/>
-          <a:p>
-            <a:pPr algn="r"/>
-            <a:r>
-              <a:rPr lang="en-US" altLang="ko-KR" sz="1400" b="1" dirty="0" smtClean="0">
-                <a:latin typeface="Helvetica" panose="020B0604020202030204" pitchFamily="34" charset="0"/>
-                <a:cs typeface="Arial" panose="020B0604020202020204" pitchFamily="34" charset="0"/>
-              </a:rPr>
-              <a:t>Non-White</a:t>
-            </a:r>
-            <a:endParaRPr lang="ko-KR" altLang="en-US" sz="1400" b="1" dirty="0">
-              <a:latin typeface="Helvetica" panose="020B0604020202030204" pitchFamily="34" charset="0"/>
-              <a:cs typeface="Arial" panose="020B0604020202020204" pitchFamily="34" charset="0"/>
-            </a:endParaRPr>
-          </a:p>
-        </p:txBody>
-      </p:sp>
-      <p:sp>
-        <p:nvSpPr>
-          <p:cNvPr id="87" name="직사각형 86"/>
-          <p:cNvSpPr/>
-          <p:nvPr/>
-        </p:nvSpPr>
-        <p:spPr>
-          <a:xfrm>
-            <a:off x="6199637" y="4502414"/>
-            <a:ext cx="1390126" cy="307777"/>
-          </a:xfrm>
-          <a:prstGeom prst="rect">
-            <a:avLst/>
-          </a:prstGeom>
-        </p:spPr>
-        <p:txBody>
-          <a:bodyPr wrap="square">
-            <a:spAutoFit/>
-          </a:bodyPr>
-          <a:lstStyle/>
-          <a:p>
-            <a:r>
-              <a:rPr lang="en-US" altLang="ko-KR" sz="1400" dirty="0" smtClean="0">
-                <a:latin typeface="Helvetica" panose="020B0604020202030204" pitchFamily="34" charset="0"/>
-                <a:cs typeface="Arial" panose="020B0604020202020204" pitchFamily="34" charset="0"/>
-              </a:rPr>
-              <a:t>- 34 subjects</a:t>
-            </a:r>
-            <a:endParaRPr lang="ko-KR" altLang="en-US" sz="1400" dirty="0">
-              <a:latin typeface="Helvetica" panose="020B0604020202030204" pitchFamily="34" charset="0"/>
-              <a:cs typeface="Arial" panose="020B0604020202020204" pitchFamily="34" charset="0"/>
-            </a:endParaRPr>
-          </a:p>
-        </p:txBody>
-      </p:sp>
-      <p:sp>
-        <p:nvSpPr>
-          <p:cNvPr id="88" name="직사각형 87"/>
-          <p:cNvSpPr/>
-          <p:nvPr/>
-        </p:nvSpPr>
-        <p:spPr>
-          <a:xfrm>
-            <a:off x="8779168" y="4502413"/>
-            <a:ext cx="1379623" cy="307777"/>
-          </a:xfrm>
-          <a:prstGeom prst="rect">
-            <a:avLst/>
-          </a:prstGeom>
-        </p:spPr>
-        <p:txBody>
-          <a:bodyPr wrap="square">
-            <a:spAutoFit/>
-          </a:bodyPr>
-          <a:lstStyle/>
-          <a:p>
-            <a:r>
-              <a:rPr lang="en-US" altLang="ko-KR" sz="1400" dirty="0">
-                <a:latin typeface="Helvetica" panose="020B0604020202030204" pitchFamily="34" charset="0"/>
-                <a:cs typeface="Arial" panose="020B0604020202020204" pitchFamily="34" charset="0"/>
-              </a:rPr>
-              <a:t>- 0 </a:t>
-            </a:r>
-            <a:r>
-              <a:rPr lang="en-US" altLang="ko-KR" sz="1400" dirty="0" smtClean="0">
-                <a:latin typeface="Helvetica" panose="020B0604020202030204" pitchFamily="34" charset="0"/>
-                <a:cs typeface="Arial" panose="020B0604020202020204" pitchFamily="34" charset="0"/>
-              </a:rPr>
-              <a:t>subjects</a:t>
-            </a:r>
-            <a:endParaRPr lang="ko-KR" altLang="en-US" sz="1400" dirty="0">
-              <a:latin typeface="Helvetica" panose="020B0604020202030204" pitchFamily="34" charset="0"/>
-              <a:cs typeface="Arial" panose="020B0604020202020204" pitchFamily="34" charset="0"/>
-            </a:endParaRPr>
-          </a:p>
-        </p:txBody>
-      </p:sp>
-      <p:sp>
-        <p:nvSpPr>
           <p:cNvPr id="89" name="직사각형 88"/>
           <p:cNvSpPr/>
           <p:nvPr/>
@@ -33146,7 +32519,7 @@
         <p:spPr>
           <a:xfrm>
             <a:off x="7495285" y="8135820"/>
-            <a:ext cx="0" cy="2834640"/>
+            <a:ext cx="0" cy="3132000"/>
           </a:xfrm>
           <a:prstGeom prst="straightConnector1">
             <a:avLst/>
@@ -33207,92 +32580,6 @@
       </p:sp>
       <p:sp>
         <p:nvSpPr>
-          <p:cNvPr id="115" name="직사각형 114"/>
-          <p:cNvSpPr/>
-          <p:nvPr/>
-        </p:nvSpPr>
-        <p:spPr>
-          <a:xfrm>
-            <a:off x="2919408" y="10432374"/>
-            <a:ext cx="3646963" cy="307778"/>
-          </a:xfrm>
-          <a:prstGeom prst="rect">
-            <a:avLst/>
-          </a:prstGeom>
-        </p:spPr>
-        <p:txBody>
-          <a:bodyPr wrap="square">
-            <a:spAutoFit/>
-          </a:bodyPr>
-          <a:lstStyle/>
-          <a:p>
-            <a:pPr algn="r"/>
-            <a:r>
-              <a:rPr lang="en-US" altLang="ko-KR" sz="1400" b="1" dirty="0">
-                <a:latin typeface="Helvetica" panose="020B0604020202030204" pitchFamily="34" charset="0"/>
-                <a:cs typeface="Arial" panose="020B0604020202020204" pitchFamily="34" charset="0"/>
-              </a:rPr>
-              <a:t>Missing genotype rate &gt; 0.05</a:t>
-            </a:r>
-            <a:r>
-              <a:rPr lang="ko-KR" altLang="en-US" sz="1400" b="1" dirty="0">
-                <a:latin typeface="Helvetica" panose="020B0604020202030204" pitchFamily="34" charset="0"/>
-                <a:cs typeface="Arial" panose="020B0604020202020204" pitchFamily="34" charset="0"/>
-              </a:rPr>
-              <a:t> </a:t>
-            </a:r>
-            <a:r>
-              <a:rPr lang="en-US" altLang="ko-KR" sz="1400" b="1" dirty="0">
-                <a:latin typeface="Helvetica" panose="020B0604020202030204" pitchFamily="34" charset="0"/>
-                <a:cs typeface="Arial" panose="020B0604020202020204" pitchFamily="34" charset="0"/>
-              </a:rPr>
-              <a:t>&amp; IBS &gt; 0.8</a:t>
-            </a:r>
-            <a:endParaRPr lang="ko-KR" altLang="en-US" sz="1400" b="1" dirty="0">
-              <a:latin typeface="Helvetica" panose="020B0604020202030204" pitchFamily="34" charset="0"/>
-              <a:cs typeface="Arial" panose="020B0604020202020204" pitchFamily="34" charset="0"/>
-            </a:endParaRPr>
-          </a:p>
-        </p:txBody>
-      </p:sp>
-      <p:sp>
-        <p:nvSpPr>
-          <p:cNvPr id="116" name="직사각형 115"/>
-          <p:cNvSpPr/>
-          <p:nvPr/>
-        </p:nvSpPr>
-        <p:spPr>
-          <a:xfrm>
-            <a:off x="3604448" y="10161609"/>
-            <a:ext cx="2961923" cy="305791"/>
-          </a:xfrm>
-          <a:prstGeom prst="rect">
-            <a:avLst/>
-          </a:prstGeom>
-        </p:spPr>
-        <p:txBody>
-          <a:bodyPr wrap="square">
-            <a:spAutoFit/>
-          </a:bodyPr>
-          <a:lstStyle/>
-          <a:p>
-            <a:pPr algn="r"/>
-            <a:r>
-              <a:rPr lang="en-US" altLang="ko-KR" sz="1400" b="1" dirty="0" smtClean="0">
-                <a:latin typeface="Helvetica" panose="020B0604020202030204" pitchFamily="34" charset="0"/>
-                <a:cs typeface="Arial" panose="020B0604020202020204" pitchFamily="34" charset="0"/>
-              </a:rPr>
-              <a:t>Outlier (EIGENSTRAT)</a:t>
-            </a:r>
-            <a:endParaRPr lang="ko-KR" altLang="en-US" sz="1400" b="1" dirty="0">
-              <a:latin typeface="Helvetica" panose="020B0604020202030204" pitchFamily="34" charset="0"/>
-              <a:cs typeface="Arial" panose="020B0604020202020204" pitchFamily="34" charset="0"/>
-            </a:endParaRPr>
-          </a:p>
-        </p:txBody>
-      </p:sp>
-      <p:sp>
-        <p:nvSpPr>
           <p:cNvPr id="118" name="직사각형 117"/>
           <p:cNvSpPr/>
           <p:nvPr/>
@@ -33328,90 +32615,13 @@
       </p:sp>
       <p:sp>
         <p:nvSpPr>
-          <p:cNvPr id="119" name="직사각형 118"/>
-          <p:cNvSpPr/>
-          <p:nvPr/>
-        </p:nvSpPr>
-        <p:spPr>
-          <a:xfrm>
-            <a:off x="7496096" y="10432375"/>
-            <a:ext cx="1379623" cy="307777"/>
-          </a:xfrm>
-          <a:prstGeom prst="rect">
-            <a:avLst/>
-          </a:prstGeom>
-        </p:spPr>
-        <p:txBody>
-          <a:bodyPr wrap="square">
-            <a:spAutoFit/>
-          </a:bodyPr>
-          <a:lstStyle/>
-          <a:p>
-            <a:r>
-              <a:rPr lang="en-US" altLang="ko-KR" sz="1400" dirty="0">
-                <a:latin typeface="Helvetica" panose="020B0604020202030204" pitchFamily="34" charset="0"/>
-                <a:cs typeface="Arial" panose="020B0604020202020204" pitchFamily="34" charset="0"/>
-              </a:rPr>
-              <a:t>- 0 subjects</a:t>
-            </a:r>
-            <a:endParaRPr lang="ko-KR" altLang="en-US" sz="1400" dirty="0">
-              <a:latin typeface="Helvetica" panose="020B0604020202030204" pitchFamily="34" charset="0"/>
-              <a:cs typeface="Arial" panose="020B0604020202020204" pitchFamily="34" charset="0"/>
-            </a:endParaRPr>
-          </a:p>
-        </p:txBody>
-      </p:sp>
-      <p:sp>
-        <p:nvSpPr>
-          <p:cNvPr id="121" name="직사각형 120"/>
-          <p:cNvSpPr/>
-          <p:nvPr/>
-        </p:nvSpPr>
-        <p:spPr>
-          <a:xfrm>
-            <a:off x="7495285" y="10153236"/>
-            <a:ext cx="2741678" cy="314164"/>
-          </a:xfrm>
-          <a:prstGeom prst="rect">
-            <a:avLst/>
-          </a:prstGeom>
-        </p:spPr>
-        <p:txBody>
-          <a:bodyPr wrap="square">
-            <a:spAutoFit/>
-          </a:bodyPr>
-          <a:lstStyle/>
-          <a:p>
-            <a:r>
-              <a:rPr lang="en-US" altLang="ko-KR" sz="1400" dirty="0">
-                <a:latin typeface="Helvetica" panose="020B0604020202030204" pitchFamily="34" charset="0"/>
-                <a:cs typeface="Arial" panose="020B0604020202020204" pitchFamily="34" charset="0"/>
-              </a:rPr>
-              <a:t>- 1</a:t>
-            </a:r>
-            <a:r>
-              <a:rPr lang="en-US" altLang="ko-KR" sz="1400" dirty="0" smtClean="0">
-                <a:latin typeface="Helvetica" panose="020B0604020202030204" pitchFamily="34" charset="0"/>
-                <a:cs typeface="Arial" panose="020B0604020202020204" pitchFamily="34" charset="0"/>
-              </a:rPr>
-              <a:t> subject (1 case)</a:t>
-            </a:r>
-            <a:endParaRPr lang="ko-KR" altLang="en-US" sz="1400" dirty="0">
-              <a:latin typeface="Helvetica" panose="020B0604020202030204" pitchFamily="34" charset="0"/>
-              <a:cs typeface="Arial" panose="020B0604020202020204" pitchFamily="34" charset="0"/>
-            </a:endParaRPr>
-          </a:p>
-        </p:txBody>
-      </p:sp>
-      <p:sp>
-        <p:nvSpPr>
           <p:cNvPr id="122" name="모서리가 둥근 직사각형 121"/>
           <p:cNvSpPr/>
           <p:nvPr/>
         </p:nvSpPr>
         <p:spPr>
           <a:xfrm>
-            <a:off x="6566371" y="11021374"/>
+            <a:off x="6574105" y="11324732"/>
             <a:ext cx="1857600" cy="957600"/>
           </a:xfrm>
           <a:prstGeom prst="roundRect">
@@ -33478,7 +32688,7 @@
                 <a:latin typeface="Helvetica" panose="020B0604020202030204" pitchFamily="34" charset="0"/>
                 <a:cs typeface="Arial" panose="020B0604020202020204" pitchFamily="34" charset="0"/>
               </a:rPr>
-              <a:t>1,689 </a:t>
+              <a:t>1,284 </a:t>
             </a:r>
             <a:r>
               <a:rPr lang="en-US" altLang="ko-KR" sz="1600" dirty="0">
@@ -33833,8 +33043,8 @@
           </a:p>
         </p:txBody>
       </p:sp>
-      <mc:AlternateContent xmlns:mc="http://schemas.openxmlformats.org/markup-compatibility/2006">
-        <mc:Choice xmlns:a14="http://schemas.microsoft.com/office/drawing/2010/main" Requires="a14">
+      <mc:AlternateContent xmlns:mc="http://schemas.openxmlformats.org/markup-compatibility/2006" xmlns:a14="http://schemas.microsoft.com/office/drawing/2010/main">
+        <mc:Choice Requires="a14">
           <p:sp>
             <p:nvSpPr>
               <p:cNvPr id="75" name="직사각형 59"/>
@@ -33961,7 +33171,7 @@
             </p:txBody>
           </p:sp>
         </mc:Choice>
-        <mc:Fallback>
+        <mc:Fallback xmlns="">
           <p:sp>
             <p:nvSpPr>
               <p:cNvPr id="75" name="직사각형 59"/>
@@ -34092,6 +33302,798 @@
             </a:r>
             <a:endParaRPr lang="ko-KR" altLang="en-US" sz="1400" dirty="0">
               <a:latin typeface="Helvetica" panose="020B0604020202020204" pitchFamily="34" charset="0"/>
+              <a:cs typeface="Helvetica" panose="020B0604020202020204" pitchFamily="34" charset="0"/>
+            </a:endParaRPr>
+          </a:p>
+        </p:txBody>
+      </p:sp>
+      <mc:AlternateContent xmlns:mc="http://schemas.openxmlformats.org/markup-compatibility/2006">
+        <mc:Choice xmlns:a14="http://schemas.microsoft.com/office/drawing/2010/main" Requires="a14">
+          <p:sp>
+            <p:nvSpPr>
+              <p:cNvPr id="54" name="직사각형 59"/>
+              <p:cNvSpPr/>
+              <p:nvPr/>
+            </p:nvSpPr>
+            <p:spPr>
+              <a:xfrm>
+                <a:off x="2514600" y="3186939"/>
+                <a:ext cx="2826498" cy="932563"/>
+              </a:xfrm>
+              <a:prstGeom prst="rect">
+                <a:avLst/>
+              </a:prstGeom>
+            </p:spPr>
+            <p:txBody>
+              <a:bodyPr wrap="square">
+                <a:spAutoFit/>
+              </a:bodyPr>
+              <a:lstStyle/>
+              <a:p>
+                <a:pPr algn="r">
+                  <a:lnSpc>
+                    <a:spcPct val="130000"/>
+                  </a:lnSpc>
+                </a:pPr>
+                <a:r>
+                  <a:rPr lang="en-US" altLang="ko-KR" sz="1400" b="1" dirty="0" smtClean="0">
+                    <a:latin typeface="Helvetica" panose="020B0604020202030204" pitchFamily="34" charset="0"/>
+                    <a:cs typeface="Arial" panose="020B0604020202020204" pitchFamily="34" charset="0"/>
+                  </a:rPr>
+                  <a:t>Missing </a:t>
+                </a:r>
+                <a:r>
+                  <a:rPr lang="en-US" altLang="ko-KR" sz="1400" b="1" dirty="0">
+                    <a:latin typeface="Helvetica" panose="020B0604020202030204" pitchFamily="34" charset="0"/>
+                    <a:cs typeface="Arial" panose="020B0604020202020204" pitchFamily="34" charset="0"/>
+                  </a:rPr>
+                  <a:t>genotype rate &gt; </a:t>
+                </a:r>
+                <a:r>
+                  <a:rPr lang="en-US" altLang="ko-KR" sz="1400" b="1" dirty="0" smtClean="0">
+                    <a:latin typeface="Helvetica" panose="020B0604020202030204" pitchFamily="34" charset="0"/>
+                    <a:cs typeface="Arial" panose="020B0604020202020204" pitchFamily="34" charset="0"/>
+                  </a:rPr>
+                  <a:t>0.05</a:t>
+                </a:r>
+              </a:p>
+              <a:p>
+                <a:pPr algn="r">
+                  <a:lnSpc>
+                    <a:spcPct val="130000"/>
+                  </a:lnSpc>
+                </a:pPr>
+                <a:r>
+                  <a:rPr lang="en-US" altLang="ko-KR" sz="1400" b="1" dirty="0">
+                    <a:latin typeface="Helvetica" panose="020B0604020202030204" pitchFamily="34" charset="0"/>
+                    <a:cs typeface="Arial" panose="020B0604020202020204" pitchFamily="34" charset="0"/>
+                  </a:rPr>
+                  <a:t>P-value of HWE &lt; 1</a:t>
+                </a:r>
+                <a14:m>
+                  <m:oMath xmlns:m="http://schemas.openxmlformats.org/officeDocument/2006/math">
+                    <m:r>
+                      <a:rPr lang="en-US" altLang="ko-KR" sz="1400" b="1" i="1">
+                        <a:latin typeface="Cambria Math"/>
+                      </a:rPr>
+                      <m:t>×</m:t>
+                    </m:r>
+                  </m:oMath>
+                </a14:m>
+                <a:r>
+                  <a:rPr lang="en-US" altLang="ko-KR" sz="1400" b="1" dirty="0">
+                    <a:latin typeface="Helvetica" panose="020B0604020202030204" pitchFamily="34" charset="0"/>
+                    <a:cs typeface="Arial" panose="020B0604020202020204" pitchFamily="34" charset="0"/>
+                  </a:rPr>
+                  <a:t>10</a:t>
+                </a:r>
+                <a:r>
+                  <a:rPr lang="en-US" altLang="ko-KR" sz="1400" b="1" baseline="30000" dirty="0">
+                    <a:latin typeface="Helvetica" panose="020B0604020202030204" pitchFamily="34" charset="0"/>
+                    <a:cs typeface="Arial" panose="020B0604020202020204" pitchFamily="34" charset="0"/>
+                  </a:rPr>
+                  <a:t>-5</a:t>
+                </a:r>
+                <a:endParaRPr lang="ko-KR" altLang="en-US" sz="1400" b="1" dirty="0">
+                  <a:latin typeface="Helvetica" panose="020B0604020202030204" pitchFamily="34" charset="0"/>
+                  <a:cs typeface="Arial" panose="020B0604020202020204" pitchFamily="34" charset="0"/>
+                </a:endParaRPr>
+              </a:p>
+              <a:p>
+                <a:pPr algn="r">
+                  <a:lnSpc>
+                    <a:spcPct val="130000"/>
+                  </a:lnSpc>
+                </a:pPr>
+                <a:r>
+                  <a:rPr lang="en-US" altLang="ko-KR" sz="1400" b="1" dirty="0">
+                    <a:latin typeface="Helvetica" panose="020B0604020202030204" pitchFamily="34" charset="0"/>
+                    <a:cs typeface="Arial" panose="020B0604020202020204" pitchFamily="34" charset="0"/>
+                  </a:rPr>
+                  <a:t>MAF &lt; </a:t>
+                </a:r>
+                <a:r>
+                  <a:rPr lang="en-US" altLang="ko-KR" sz="1400" b="1" dirty="0" smtClean="0">
+                    <a:latin typeface="Helvetica" panose="020B0604020202030204" pitchFamily="34" charset="0"/>
+                    <a:cs typeface="Arial" panose="020B0604020202020204" pitchFamily="34" charset="0"/>
+                  </a:rPr>
+                  <a:t>0.05</a:t>
+                </a:r>
+                <a:endParaRPr lang="ko-KR" altLang="en-US" sz="1400" b="1" dirty="0">
+                  <a:latin typeface="Helvetica" panose="020B0604020202030204" pitchFamily="34" charset="0"/>
+                  <a:cs typeface="Arial" panose="020B0604020202020204" pitchFamily="34" charset="0"/>
+                </a:endParaRPr>
+              </a:p>
+            </p:txBody>
+          </p:sp>
+        </mc:Choice>
+        <mc:Fallback>
+          <p:sp>
+            <p:nvSpPr>
+              <p:cNvPr id="54" name="직사각형 59"/>
+              <p:cNvSpPr>
+                <a:spLocks noRot="1" noChangeAspect="1" noMove="1" noResize="1" noEditPoints="1" noAdjustHandles="1" noChangeArrowheads="1" noChangeShapeType="1" noTextEdit="1"/>
+              </p:cNvSpPr>
+              <p:nvPr/>
+            </p:nvSpPr>
+            <p:spPr>
+              <a:xfrm>
+                <a:off x="2514600" y="3186939"/>
+                <a:ext cx="2826498" cy="932563"/>
+              </a:xfrm>
+              <a:prstGeom prst="rect">
+                <a:avLst/>
+              </a:prstGeom>
+              <a:blipFill rotWithShape="1">
+                <a:blip r:embed="rId4"/>
+                <a:stretch>
+                  <a:fillRect r="-864" b="-2614"/>
+                </a:stretch>
+              </a:blipFill>
+            </p:spPr>
+            <p:txBody>
+              <a:bodyPr/>
+              <a:lstStyle/>
+              <a:p>
+                <a:r>
+                  <a:rPr lang="ko-KR" altLang="en-US">
+                    <a:noFill/>
+                  </a:rPr>
+                  <a:t> </a:t>
+                </a:r>
+              </a:p>
+            </p:txBody>
+          </p:sp>
+        </mc:Fallback>
+      </mc:AlternateContent>
+      <p:sp>
+        <p:nvSpPr>
+          <p:cNvPr id="59" name="직사각형 59"/>
+          <p:cNvSpPr/>
+          <p:nvPr/>
+        </p:nvSpPr>
+        <p:spPr>
+          <a:xfrm>
+            <a:off x="2514600" y="4469159"/>
+            <a:ext cx="2788398" cy="932563"/>
+          </a:xfrm>
+          <a:prstGeom prst="rect">
+            <a:avLst/>
+          </a:prstGeom>
+        </p:spPr>
+        <p:txBody>
+          <a:bodyPr wrap="square">
+            <a:spAutoFit/>
+          </a:bodyPr>
+          <a:lstStyle/>
+          <a:p>
+            <a:pPr algn="r">
+              <a:lnSpc>
+                <a:spcPct val="130000"/>
+              </a:lnSpc>
+            </a:pPr>
+            <a:r>
+              <a:rPr lang="en-US" altLang="ko-KR" sz="1400" b="1" dirty="0">
+                <a:latin typeface="Helvetica" panose="020B0604020202030204" pitchFamily="34" charset="0"/>
+                <a:cs typeface="Arial" panose="020B0604020202020204" pitchFamily="34" charset="0"/>
+              </a:rPr>
+              <a:t>Non-White</a:t>
+            </a:r>
+            <a:endParaRPr lang="ko-KR" altLang="en-US" sz="1400" b="1" dirty="0">
+              <a:latin typeface="Helvetica" panose="020B0604020202030204" pitchFamily="34" charset="0"/>
+              <a:cs typeface="Arial" panose="020B0604020202020204" pitchFamily="34" charset="0"/>
+            </a:endParaRPr>
+          </a:p>
+          <a:p>
+            <a:pPr algn="r">
+              <a:lnSpc>
+                <a:spcPct val="130000"/>
+              </a:lnSpc>
+            </a:pPr>
+            <a:r>
+              <a:rPr lang="en-US" altLang="ko-KR" sz="1400" b="1" dirty="0" smtClean="0">
+                <a:latin typeface="Helvetica" panose="020B0604020202030204" pitchFamily="34" charset="0"/>
+                <a:cs typeface="Arial" panose="020B0604020202020204" pitchFamily="34" charset="0"/>
+              </a:rPr>
+              <a:t>Missing </a:t>
+            </a:r>
+            <a:r>
+              <a:rPr lang="en-US" altLang="ko-KR" sz="1400" b="1" dirty="0">
+                <a:latin typeface="Helvetica" panose="020B0604020202030204" pitchFamily="34" charset="0"/>
+                <a:cs typeface="Arial" panose="020B0604020202020204" pitchFamily="34" charset="0"/>
+              </a:rPr>
+              <a:t>genotype rate &gt; </a:t>
+            </a:r>
+            <a:r>
+              <a:rPr lang="en-US" altLang="ko-KR" sz="1400" b="1" dirty="0" smtClean="0">
+                <a:latin typeface="Helvetica" panose="020B0604020202030204" pitchFamily="34" charset="0"/>
+                <a:cs typeface="Arial" panose="020B0604020202020204" pitchFamily="34" charset="0"/>
+              </a:rPr>
+              <a:t>0.05</a:t>
+            </a:r>
+          </a:p>
+          <a:p>
+            <a:pPr algn="r">
+              <a:lnSpc>
+                <a:spcPct val="130000"/>
+              </a:lnSpc>
+            </a:pPr>
+            <a:r>
+              <a:rPr lang="en-US" altLang="ko-KR" sz="1400" b="1" dirty="0">
+                <a:latin typeface="Helvetica" panose="020B0604020202030204" pitchFamily="34" charset="0"/>
+                <a:cs typeface="Arial" panose="020B0604020202020204" pitchFamily="34" charset="0"/>
+              </a:rPr>
+              <a:t>IBS &gt; </a:t>
+            </a:r>
+            <a:r>
+              <a:rPr lang="en-US" altLang="ko-KR" sz="1400" b="1" dirty="0" smtClean="0">
+                <a:latin typeface="Helvetica" panose="020B0604020202030204" pitchFamily="34" charset="0"/>
+                <a:cs typeface="Arial" panose="020B0604020202020204" pitchFamily="34" charset="0"/>
+              </a:rPr>
+              <a:t>0.8</a:t>
+            </a:r>
+            <a:endParaRPr lang="ko-KR" altLang="en-US" sz="1400" b="1" dirty="0">
+              <a:latin typeface="Helvetica" panose="020B0604020202030204" pitchFamily="34" charset="0"/>
+              <a:cs typeface="Arial" panose="020B0604020202020204" pitchFamily="34" charset="0"/>
+            </a:endParaRPr>
+          </a:p>
+        </p:txBody>
+      </p:sp>
+      <p:sp>
+        <p:nvSpPr>
+          <p:cNvPr id="65" name="직사각형 59"/>
+          <p:cNvSpPr/>
+          <p:nvPr/>
+        </p:nvSpPr>
+        <p:spPr>
+          <a:xfrm>
+            <a:off x="2773680" y="10088811"/>
+            <a:ext cx="3792691" cy="932563"/>
+          </a:xfrm>
+          <a:prstGeom prst="rect">
+            <a:avLst/>
+          </a:prstGeom>
+        </p:spPr>
+        <p:txBody>
+          <a:bodyPr wrap="square">
+            <a:spAutoFit/>
+          </a:bodyPr>
+          <a:lstStyle/>
+          <a:p>
+            <a:pPr algn="r">
+              <a:lnSpc>
+                <a:spcPct val="130000"/>
+              </a:lnSpc>
+            </a:pPr>
+            <a:r>
+              <a:rPr lang="en-US" altLang="ko-KR" sz="1400" b="1" dirty="0">
+                <a:latin typeface="Helvetica" panose="020B0604020202030204" pitchFamily="34" charset="0"/>
+                <a:cs typeface="Arial" panose="020B0604020202020204" pitchFamily="34" charset="0"/>
+              </a:rPr>
+              <a:t>Outlier (EIGENSTRAT)</a:t>
+            </a:r>
+            <a:endParaRPr lang="ko-KR" altLang="en-US" sz="1400" b="1" dirty="0">
+              <a:latin typeface="Helvetica" panose="020B0604020202030204" pitchFamily="34" charset="0"/>
+              <a:cs typeface="Arial" panose="020B0604020202020204" pitchFamily="34" charset="0"/>
+            </a:endParaRPr>
+          </a:p>
+          <a:p>
+            <a:pPr algn="r">
+              <a:lnSpc>
+                <a:spcPct val="130000"/>
+              </a:lnSpc>
+            </a:pPr>
+            <a:r>
+              <a:rPr lang="en-US" altLang="ko-KR" sz="1400" b="1" dirty="0">
+                <a:latin typeface="Helvetica" panose="020B0604020202030204" pitchFamily="34" charset="0"/>
+                <a:cs typeface="Arial" panose="020B0604020202020204" pitchFamily="34" charset="0"/>
+              </a:rPr>
+              <a:t>Missing genotype rate &gt; 0.05</a:t>
+            </a:r>
+            <a:r>
+              <a:rPr lang="ko-KR" altLang="en-US" sz="1400" b="1" dirty="0">
+                <a:latin typeface="Helvetica" panose="020B0604020202030204" pitchFamily="34" charset="0"/>
+                <a:cs typeface="Arial" panose="020B0604020202020204" pitchFamily="34" charset="0"/>
+              </a:rPr>
+              <a:t> </a:t>
+            </a:r>
+            <a:r>
+              <a:rPr lang="en-US" altLang="ko-KR" sz="1400" b="1" dirty="0">
+                <a:latin typeface="Helvetica" panose="020B0604020202030204" pitchFamily="34" charset="0"/>
+                <a:cs typeface="Arial" panose="020B0604020202020204" pitchFamily="34" charset="0"/>
+              </a:rPr>
+              <a:t>&amp; IBS &gt; 0.8</a:t>
+            </a:r>
+            <a:endParaRPr lang="ko-KR" altLang="en-US" sz="1400" b="1" dirty="0">
+              <a:latin typeface="Helvetica" panose="020B0604020202030204" pitchFamily="34" charset="0"/>
+              <a:cs typeface="Arial" panose="020B0604020202020204" pitchFamily="34" charset="0"/>
+            </a:endParaRPr>
+          </a:p>
+          <a:p>
+            <a:pPr algn="r">
+              <a:lnSpc>
+                <a:spcPct val="130000"/>
+              </a:lnSpc>
+            </a:pPr>
+            <a:r>
+              <a:rPr lang="en-US" altLang="ko-KR" sz="1400" b="1" dirty="0" smtClean="0">
+                <a:latin typeface="Helvetica" panose="020B0604020202030204" pitchFamily="34" charset="0"/>
+                <a:cs typeface="Arial" panose="020B0604020202020204" pitchFamily="34" charset="0"/>
+              </a:rPr>
+              <a:t>Matching</a:t>
+            </a:r>
+            <a:endParaRPr lang="ko-KR" altLang="en-US" sz="1400" b="1" dirty="0">
+              <a:latin typeface="Helvetica" panose="020B0604020202030204" pitchFamily="34" charset="0"/>
+              <a:cs typeface="Arial" panose="020B0604020202020204" pitchFamily="34" charset="0"/>
+            </a:endParaRPr>
+          </a:p>
+        </p:txBody>
+      </p:sp>
+      <p:sp>
+        <p:nvSpPr>
+          <p:cNvPr id="69" name="직사각형 59"/>
+          <p:cNvSpPr/>
+          <p:nvPr/>
+        </p:nvSpPr>
+        <p:spPr>
+          <a:xfrm>
+            <a:off x="7494691" y="10088811"/>
+            <a:ext cx="2545662" cy="932563"/>
+          </a:xfrm>
+          <a:prstGeom prst="rect">
+            <a:avLst/>
+          </a:prstGeom>
+        </p:spPr>
+        <p:txBody>
+          <a:bodyPr wrap="square">
+            <a:spAutoFit/>
+          </a:bodyPr>
+          <a:lstStyle/>
+          <a:p>
+            <a:pPr>
+              <a:lnSpc>
+                <a:spcPct val="130000"/>
+              </a:lnSpc>
+            </a:pPr>
+            <a:r>
+              <a:rPr lang="en-US" altLang="ko-KR" sz="1400" dirty="0">
+                <a:latin typeface="Helvetica" panose="020B0604020202030204" pitchFamily="34" charset="0"/>
+                <a:cs typeface="Arial" panose="020B0604020202020204" pitchFamily="34" charset="0"/>
+              </a:rPr>
+              <a:t>- 1 subject (1 case)</a:t>
+            </a:r>
+            <a:endParaRPr lang="ko-KR" altLang="en-US" sz="1400" dirty="0">
+              <a:latin typeface="Helvetica" panose="020B0604020202030204" pitchFamily="34" charset="0"/>
+              <a:cs typeface="Arial" panose="020B0604020202020204" pitchFamily="34" charset="0"/>
+            </a:endParaRPr>
+          </a:p>
+          <a:p>
+            <a:pPr>
+              <a:lnSpc>
+                <a:spcPct val="130000"/>
+              </a:lnSpc>
+            </a:pPr>
+            <a:r>
+              <a:rPr lang="en-US" altLang="ko-KR" sz="1400" dirty="0">
+                <a:latin typeface="Helvetica" panose="020B0604020202030204" pitchFamily="34" charset="0"/>
+                <a:cs typeface="Arial" panose="020B0604020202020204" pitchFamily="34" charset="0"/>
+              </a:rPr>
+              <a:t>- 0 subjects</a:t>
+            </a:r>
+            <a:endParaRPr lang="ko-KR" altLang="en-US" sz="1400" dirty="0">
+              <a:latin typeface="Helvetica" panose="020B0604020202030204" pitchFamily="34" charset="0"/>
+              <a:cs typeface="Arial" panose="020B0604020202020204" pitchFamily="34" charset="0"/>
+            </a:endParaRPr>
+          </a:p>
+          <a:p>
+            <a:pPr>
+              <a:lnSpc>
+                <a:spcPct val="130000"/>
+              </a:lnSpc>
+            </a:pPr>
+            <a:r>
+              <a:rPr lang="en-US" altLang="ko-KR" sz="1400" dirty="0" smtClean="0">
+                <a:latin typeface="Helvetica" panose="020B0604020202030204" pitchFamily="34" charset="0"/>
+                <a:cs typeface="Helvetica" panose="020B0604020202020204" pitchFamily="34" charset="0"/>
+              </a:rPr>
+              <a:t>- 405 subjects (405 controls)</a:t>
+            </a:r>
+            <a:endParaRPr lang="ko-KR" altLang="en-US" sz="1400" dirty="0">
+              <a:latin typeface="Helvetica" panose="020B0604020202030204" pitchFamily="34" charset="0"/>
+              <a:cs typeface="Helvetica" panose="020B0604020202020204" pitchFamily="34" charset="0"/>
+            </a:endParaRPr>
+          </a:p>
+        </p:txBody>
+      </p:sp>
+      <p:sp>
+        <p:nvSpPr>
+          <p:cNvPr id="74" name="직사각형 59"/>
+          <p:cNvSpPr/>
+          <p:nvPr/>
+        </p:nvSpPr>
+        <p:spPr>
+          <a:xfrm>
+            <a:off x="6199637" y="3200981"/>
+            <a:ext cx="1620895" cy="904478"/>
+          </a:xfrm>
+          <a:prstGeom prst="rect">
+            <a:avLst/>
+          </a:prstGeom>
+        </p:spPr>
+        <p:txBody>
+          <a:bodyPr wrap="square">
+            <a:spAutoFit/>
+          </a:bodyPr>
+          <a:lstStyle/>
+          <a:p>
+            <a:pPr>
+              <a:lnSpc>
+                <a:spcPct val="130000"/>
+              </a:lnSpc>
+            </a:pPr>
+            <a:r>
+              <a:rPr lang="en-US" altLang="ko-KR" sz="1400" dirty="0">
+                <a:latin typeface="Helvetica" panose="020B0604020202030204" pitchFamily="34" charset="0"/>
+                <a:cs typeface="Arial" panose="020B0604020202020204" pitchFamily="34" charset="0"/>
+              </a:rPr>
+              <a:t>- 11,702 SNPs</a:t>
+            </a:r>
+            <a:endParaRPr lang="ko-KR" altLang="en-US" sz="1400" dirty="0">
+              <a:latin typeface="Helvetica" panose="020B0604020202030204" pitchFamily="34" charset="0"/>
+              <a:cs typeface="Arial" panose="020B0604020202020204" pitchFamily="34" charset="0"/>
+            </a:endParaRPr>
+          </a:p>
+          <a:p>
+            <a:pPr>
+              <a:lnSpc>
+                <a:spcPct val="130000"/>
+              </a:lnSpc>
+            </a:pPr>
+            <a:r>
+              <a:rPr lang="en-US" altLang="ko-KR" sz="1400" dirty="0">
+                <a:latin typeface="Helvetica" panose="020B0604020202030204" pitchFamily="34" charset="0"/>
+                <a:cs typeface="Arial" panose="020B0604020202020204" pitchFamily="34" charset="0"/>
+              </a:rPr>
+              <a:t>- 142 SNPs</a:t>
+            </a:r>
+            <a:endParaRPr lang="ko-KR" altLang="en-US" sz="1400" dirty="0">
+              <a:latin typeface="Helvetica" panose="020B0604020202030204" pitchFamily="34" charset="0"/>
+              <a:cs typeface="Arial" panose="020B0604020202020204" pitchFamily="34" charset="0"/>
+            </a:endParaRPr>
+          </a:p>
+          <a:p>
+            <a:pPr>
+              <a:lnSpc>
+                <a:spcPct val="130000"/>
+              </a:lnSpc>
+            </a:pPr>
+            <a:r>
+              <a:rPr lang="en-US" altLang="ko-KR" sz="1400" dirty="0">
+                <a:latin typeface="Helvetica" panose="020B0604020202030204" pitchFamily="34" charset="0"/>
+                <a:cs typeface="Arial" panose="020B0604020202020204" pitchFamily="34" charset="0"/>
+              </a:rPr>
+              <a:t>- 41,838 SNPs</a:t>
+            </a:r>
+            <a:endParaRPr lang="ko-KR" altLang="en-US" sz="1400" dirty="0">
+              <a:latin typeface="Helvetica" panose="020B0604020202030204" pitchFamily="34" charset="0"/>
+              <a:cs typeface="Arial" panose="020B0604020202020204" pitchFamily="34" charset="0"/>
+            </a:endParaRPr>
+          </a:p>
+        </p:txBody>
+      </p:sp>
+      <p:sp>
+        <p:nvSpPr>
+          <p:cNvPr id="77" name="직사각형 59"/>
+          <p:cNvSpPr/>
+          <p:nvPr/>
+        </p:nvSpPr>
+        <p:spPr>
+          <a:xfrm>
+            <a:off x="8779168" y="3186938"/>
+            <a:ext cx="1620895" cy="932563"/>
+          </a:xfrm>
+          <a:prstGeom prst="rect">
+            <a:avLst/>
+          </a:prstGeom>
+        </p:spPr>
+        <p:txBody>
+          <a:bodyPr wrap="square">
+            <a:spAutoFit/>
+          </a:bodyPr>
+          <a:lstStyle/>
+          <a:p>
+            <a:pPr>
+              <a:lnSpc>
+                <a:spcPct val="130000"/>
+              </a:lnSpc>
+            </a:pPr>
+            <a:r>
+              <a:rPr lang="en-US" altLang="ko-KR" sz="1400" dirty="0">
+                <a:latin typeface="Helvetica" panose="020B0604020202030204" pitchFamily="34" charset="0"/>
+                <a:cs typeface="Arial" panose="020B0604020202020204" pitchFamily="34" charset="0"/>
+              </a:rPr>
+              <a:t>- </a:t>
+            </a:r>
+            <a:r>
+              <a:rPr lang="en-US" altLang="ko-KR" sz="1400" dirty="0" smtClean="0">
+                <a:latin typeface="Helvetica" panose="020B0604020202030204" pitchFamily="34" charset="0"/>
+                <a:cs typeface="Arial" panose="020B0604020202020204" pitchFamily="34" charset="0"/>
+              </a:rPr>
+              <a:t>40 SNPs</a:t>
+            </a:r>
+            <a:endParaRPr lang="ko-KR" altLang="en-US" sz="1400" dirty="0">
+              <a:latin typeface="Helvetica" panose="020B0604020202030204" pitchFamily="34" charset="0"/>
+              <a:cs typeface="Arial" panose="020B0604020202020204" pitchFamily="34" charset="0"/>
+            </a:endParaRPr>
+          </a:p>
+          <a:p>
+            <a:pPr>
+              <a:lnSpc>
+                <a:spcPct val="130000"/>
+              </a:lnSpc>
+            </a:pPr>
+            <a:r>
+              <a:rPr lang="en-US" altLang="ko-KR" sz="1400" dirty="0">
+                <a:latin typeface="Helvetica" panose="020B0604020202030204" pitchFamily="34" charset="0"/>
+                <a:cs typeface="Arial" panose="020B0604020202020204" pitchFamily="34" charset="0"/>
+              </a:rPr>
+              <a:t>- </a:t>
+            </a:r>
+            <a:r>
+              <a:rPr lang="en-US" altLang="ko-KR" sz="1400" dirty="0" smtClean="0">
+                <a:latin typeface="Helvetica" panose="020B0604020202030204" pitchFamily="34" charset="0"/>
+                <a:cs typeface="Arial" panose="020B0604020202020204" pitchFamily="34" charset="0"/>
+              </a:rPr>
+              <a:t>39 </a:t>
+            </a:r>
+            <a:r>
+              <a:rPr lang="en-US" altLang="ko-KR" sz="1400" dirty="0">
+                <a:latin typeface="Helvetica" panose="020B0604020202030204" pitchFamily="34" charset="0"/>
+                <a:cs typeface="Arial" panose="020B0604020202020204" pitchFamily="34" charset="0"/>
+              </a:rPr>
+              <a:t>SNPs</a:t>
+            </a:r>
+            <a:endParaRPr lang="ko-KR" altLang="en-US" sz="1400" dirty="0">
+              <a:latin typeface="Helvetica" panose="020B0604020202030204" pitchFamily="34" charset="0"/>
+              <a:cs typeface="Arial" panose="020B0604020202020204" pitchFamily="34" charset="0"/>
+            </a:endParaRPr>
+          </a:p>
+          <a:p>
+            <a:pPr>
+              <a:lnSpc>
+                <a:spcPct val="130000"/>
+              </a:lnSpc>
+            </a:pPr>
+            <a:r>
+              <a:rPr lang="en-US" altLang="ko-KR" sz="1400" dirty="0">
+                <a:latin typeface="Helvetica" panose="020B0604020202030204" pitchFamily="34" charset="0"/>
+                <a:cs typeface="Arial" panose="020B0604020202020204" pitchFamily="34" charset="0"/>
+              </a:rPr>
+              <a:t>- </a:t>
+            </a:r>
+            <a:r>
+              <a:rPr lang="en-US" altLang="ko-KR" sz="1400" dirty="0" smtClean="0">
+                <a:latin typeface="Helvetica" panose="020B0604020202030204" pitchFamily="34" charset="0"/>
+                <a:cs typeface="Arial" panose="020B0604020202020204" pitchFamily="34" charset="0"/>
+              </a:rPr>
+              <a:t>45,099 SNPs</a:t>
+            </a:r>
+            <a:endParaRPr lang="ko-KR" altLang="en-US" sz="1400" dirty="0">
+              <a:latin typeface="Helvetica" panose="020B0604020202030204" pitchFamily="34" charset="0"/>
+              <a:cs typeface="Arial" panose="020B0604020202020204" pitchFamily="34" charset="0"/>
+            </a:endParaRPr>
+          </a:p>
+        </p:txBody>
+      </p:sp>
+      <p:sp>
+        <p:nvSpPr>
+          <p:cNvPr id="81" name="직사각형 59"/>
+          <p:cNvSpPr/>
+          <p:nvPr/>
+        </p:nvSpPr>
+        <p:spPr>
+          <a:xfrm>
+            <a:off x="6199521" y="4469158"/>
+            <a:ext cx="1760380" cy="932563"/>
+          </a:xfrm>
+          <a:prstGeom prst="rect">
+            <a:avLst/>
+          </a:prstGeom>
+        </p:spPr>
+        <p:txBody>
+          <a:bodyPr wrap="square">
+            <a:spAutoFit/>
+          </a:bodyPr>
+          <a:lstStyle/>
+          <a:p>
+            <a:pPr>
+              <a:lnSpc>
+                <a:spcPct val="130000"/>
+              </a:lnSpc>
+            </a:pPr>
+            <a:r>
+              <a:rPr lang="en-US" altLang="ko-KR" sz="1400" dirty="0">
+                <a:latin typeface="Helvetica" panose="020B0604020202030204" pitchFamily="34" charset="0"/>
+                <a:cs typeface="Arial" panose="020B0604020202020204" pitchFamily="34" charset="0"/>
+              </a:rPr>
+              <a:t>- </a:t>
+            </a:r>
+            <a:r>
+              <a:rPr lang="en-US" altLang="ko-KR" sz="1400" dirty="0" smtClean="0">
+                <a:latin typeface="Helvetica" panose="020B0604020202030204" pitchFamily="34" charset="0"/>
+                <a:cs typeface="Arial" panose="020B0604020202020204" pitchFamily="34" charset="0"/>
+              </a:rPr>
+              <a:t>34 subjects</a:t>
+            </a:r>
+            <a:endParaRPr lang="ko-KR" altLang="en-US" sz="1400" dirty="0">
+              <a:latin typeface="Helvetica" panose="020B0604020202030204" pitchFamily="34" charset="0"/>
+              <a:cs typeface="Arial" panose="020B0604020202020204" pitchFamily="34" charset="0"/>
+            </a:endParaRPr>
+          </a:p>
+          <a:p>
+            <a:pPr>
+              <a:lnSpc>
+                <a:spcPct val="130000"/>
+              </a:lnSpc>
+            </a:pPr>
+            <a:r>
+              <a:rPr lang="en-US" altLang="ko-KR" sz="1400" dirty="0">
+                <a:latin typeface="Helvetica" panose="020B0604020202030204" pitchFamily="34" charset="0"/>
+                <a:cs typeface="Arial" panose="020B0604020202020204" pitchFamily="34" charset="0"/>
+              </a:rPr>
+              <a:t>- </a:t>
+            </a:r>
+            <a:r>
+              <a:rPr lang="en-US" altLang="ko-KR" sz="1400" dirty="0" smtClean="0">
+                <a:latin typeface="Helvetica" panose="020B0604020202030204" pitchFamily="34" charset="0"/>
+                <a:cs typeface="Arial" panose="020B0604020202020204" pitchFamily="34" charset="0"/>
+              </a:rPr>
+              <a:t>12 </a:t>
+            </a:r>
+            <a:r>
+              <a:rPr lang="en-US" altLang="ko-KR" sz="1400" dirty="0">
+                <a:latin typeface="Helvetica" panose="020B0604020202030204" pitchFamily="34" charset="0"/>
+                <a:cs typeface="Arial" panose="020B0604020202020204" pitchFamily="34" charset="0"/>
+              </a:rPr>
+              <a:t>subjects</a:t>
+            </a:r>
+            <a:endParaRPr lang="ko-KR" altLang="en-US" sz="1400" dirty="0">
+              <a:latin typeface="Helvetica" panose="020B0604020202030204" pitchFamily="34" charset="0"/>
+              <a:cs typeface="Arial" panose="020B0604020202020204" pitchFamily="34" charset="0"/>
+            </a:endParaRPr>
+          </a:p>
+          <a:p>
+            <a:pPr>
+              <a:lnSpc>
+                <a:spcPct val="130000"/>
+              </a:lnSpc>
+            </a:pPr>
+            <a:r>
+              <a:rPr lang="en-US" altLang="ko-KR" sz="1400" dirty="0" smtClean="0">
+                <a:latin typeface="Helvetica" panose="020B0604020202030204" pitchFamily="34" charset="0"/>
+                <a:cs typeface="Helvetica" panose="020B0604020202020204" pitchFamily="34" charset="0"/>
+              </a:rPr>
+              <a:t>- 4 subjects</a:t>
+            </a:r>
+            <a:endParaRPr lang="ko-KR" altLang="en-US" sz="1400" dirty="0">
+              <a:latin typeface="Helvetica" panose="020B0604020202030204" pitchFamily="34" charset="0"/>
+              <a:cs typeface="Helvetica" panose="020B0604020202020204" pitchFamily="34" charset="0"/>
+            </a:endParaRPr>
+          </a:p>
+        </p:txBody>
+      </p:sp>
+      <p:sp>
+        <p:nvSpPr>
+          <p:cNvPr id="83" name="직사각형 59"/>
+          <p:cNvSpPr/>
+          <p:nvPr/>
+        </p:nvSpPr>
+        <p:spPr>
+          <a:xfrm>
+            <a:off x="8779168" y="4469159"/>
+            <a:ext cx="1760380" cy="932563"/>
+          </a:xfrm>
+          <a:prstGeom prst="rect">
+            <a:avLst/>
+          </a:prstGeom>
+        </p:spPr>
+        <p:txBody>
+          <a:bodyPr wrap="square">
+            <a:spAutoFit/>
+          </a:bodyPr>
+          <a:lstStyle/>
+          <a:p>
+            <a:pPr>
+              <a:lnSpc>
+                <a:spcPct val="130000"/>
+              </a:lnSpc>
+            </a:pPr>
+            <a:r>
+              <a:rPr lang="en-US" altLang="ko-KR" sz="1400" dirty="0">
+                <a:latin typeface="Helvetica" panose="020B0604020202030204" pitchFamily="34" charset="0"/>
+                <a:cs typeface="Arial" panose="020B0604020202020204" pitchFamily="34" charset="0"/>
+              </a:rPr>
+              <a:t>- 0</a:t>
+            </a:r>
+            <a:r>
+              <a:rPr lang="en-US" altLang="ko-KR" sz="1400" dirty="0" smtClean="0">
+                <a:latin typeface="Helvetica" panose="020B0604020202030204" pitchFamily="34" charset="0"/>
+                <a:cs typeface="Arial" panose="020B0604020202020204" pitchFamily="34" charset="0"/>
+              </a:rPr>
+              <a:t> subject</a:t>
+            </a:r>
+            <a:endParaRPr lang="ko-KR" altLang="en-US" sz="1400" dirty="0">
+              <a:latin typeface="Helvetica" panose="020B0604020202030204" pitchFamily="34" charset="0"/>
+              <a:cs typeface="Arial" panose="020B0604020202020204" pitchFamily="34" charset="0"/>
+            </a:endParaRPr>
+          </a:p>
+          <a:p>
+            <a:pPr>
+              <a:lnSpc>
+                <a:spcPct val="130000"/>
+              </a:lnSpc>
+            </a:pPr>
+            <a:r>
+              <a:rPr lang="en-US" altLang="ko-KR" sz="1400" dirty="0">
+                <a:latin typeface="Helvetica" panose="020B0604020202030204" pitchFamily="34" charset="0"/>
+                <a:cs typeface="Arial" panose="020B0604020202020204" pitchFamily="34" charset="0"/>
+              </a:rPr>
+              <a:t>- </a:t>
+            </a:r>
+            <a:r>
+              <a:rPr lang="en-US" altLang="ko-KR" sz="1400" dirty="0" smtClean="0">
+                <a:latin typeface="Helvetica" panose="020B0604020202030204" pitchFamily="34" charset="0"/>
+                <a:cs typeface="Arial" panose="020B0604020202020204" pitchFamily="34" charset="0"/>
+              </a:rPr>
+              <a:t>0 </a:t>
+            </a:r>
+            <a:r>
+              <a:rPr lang="en-US" altLang="ko-KR" sz="1400" dirty="0">
+                <a:latin typeface="Helvetica" panose="020B0604020202030204" pitchFamily="34" charset="0"/>
+                <a:cs typeface="Arial" panose="020B0604020202020204" pitchFamily="34" charset="0"/>
+              </a:rPr>
+              <a:t>subjects</a:t>
+            </a:r>
+            <a:endParaRPr lang="ko-KR" altLang="en-US" sz="1400" dirty="0">
+              <a:latin typeface="Helvetica" panose="020B0604020202030204" pitchFamily="34" charset="0"/>
+              <a:cs typeface="Arial" panose="020B0604020202020204" pitchFamily="34" charset="0"/>
+            </a:endParaRPr>
+          </a:p>
+          <a:p>
+            <a:pPr>
+              <a:lnSpc>
+                <a:spcPct val="130000"/>
+              </a:lnSpc>
+            </a:pPr>
+            <a:r>
+              <a:rPr lang="en-US" altLang="ko-KR" sz="1400" dirty="0" smtClean="0">
+                <a:latin typeface="Helvetica" panose="020B0604020202030204" pitchFamily="34" charset="0"/>
+                <a:cs typeface="Helvetica" panose="020B0604020202020204" pitchFamily="34" charset="0"/>
+              </a:rPr>
+              <a:t>- 0 subjects</a:t>
+            </a:r>
+            <a:endParaRPr lang="ko-KR" altLang="en-US" sz="1400" dirty="0">
+              <a:latin typeface="Helvetica" panose="020B0604020202030204" pitchFamily="34" charset="0"/>
               <a:cs typeface="Helvetica" panose="020B0604020202020204" pitchFamily="34" charset="0"/>
             </a:endParaRPr>
           </a:p>
@@ -34162,7 +34164,7 @@
                 <a:gridCol w="7257143">
                   <a:extLst>
                     <a:ext uri="{9D8B030D-6E8A-4147-A177-3AD203B41FA5}">
-                      <a16:colId xmlns:a16="http://schemas.microsoft.com/office/drawing/2014/main" val="20000"/>
+                      <a16:colId xmlns:a16="http://schemas.microsoft.com/office/drawing/2014/main" xmlns="" val="20000"/>
                     </a:ext>
                   </a:extLst>
                 </a:gridCol>
@@ -34187,7 +34189,7 @@
                 </a:tc>
                 <a:extLst>
                   <a:ext uri="{0D108BD9-81ED-4DB2-BD59-A6C34878D82A}">
-                    <a16:rowId xmlns:a16="http://schemas.microsoft.com/office/drawing/2014/main" val="10000"/>
+                    <a16:rowId xmlns:a16="http://schemas.microsoft.com/office/drawing/2014/main" xmlns="" val="10000"/>
                   </a:ext>
                 </a:extLst>
               </a:tr>
@@ -34211,7 +34213,7 @@
                 </a:tc>
                 <a:extLst>
                   <a:ext uri="{0D108BD9-81ED-4DB2-BD59-A6C34878D82A}">
-                    <a16:rowId xmlns:a16="http://schemas.microsoft.com/office/drawing/2014/main" val="10001"/>
+                    <a16:rowId xmlns:a16="http://schemas.microsoft.com/office/drawing/2014/main" xmlns="" val="10001"/>
                   </a:ext>
                 </a:extLst>
               </a:tr>
@@ -34247,7 +34249,7 @@
                 <a:gridCol w="7282340">
                   <a:extLst>
                     <a:ext uri="{9D8B030D-6E8A-4147-A177-3AD203B41FA5}">
-                      <a16:colId xmlns:a16="http://schemas.microsoft.com/office/drawing/2014/main" val="20000"/>
+                      <a16:colId xmlns:a16="http://schemas.microsoft.com/office/drawing/2014/main" xmlns="" val="20000"/>
                     </a:ext>
                   </a:extLst>
                 </a:gridCol>
@@ -34272,7 +34274,7 @@
                 </a:tc>
                 <a:extLst>
                   <a:ext uri="{0D108BD9-81ED-4DB2-BD59-A6C34878D82A}">
-                    <a16:rowId xmlns:a16="http://schemas.microsoft.com/office/drawing/2014/main" val="10000"/>
+                    <a16:rowId xmlns:a16="http://schemas.microsoft.com/office/drawing/2014/main" xmlns="" val="10000"/>
                   </a:ext>
                 </a:extLst>
               </a:tr>
@@ -34296,7 +34298,7 @@
                 </a:tc>
                 <a:extLst>
                   <a:ext uri="{0D108BD9-81ED-4DB2-BD59-A6C34878D82A}">
-                    <a16:rowId xmlns:a16="http://schemas.microsoft.com/office/drawing/2014/main" val="10001"/>
+                    <a16:rowId xmlns:a16="http://schemas.microsoft.com/office/drawing/2014/main" xmlns="" val="10001"/>
                   </a:ext>
                 </a:extLst>
               </a:tr>
@@ -36893,7 +36895,7 @@
   <a:extraClrSchemeLst/>
   <a:extLst>
     <a:ext uri="{05A4C25C-085E-4340-85A3-A5531E510DB2}">
-      <thm15:themeFamily xmlns:thm15="http://schemas.microsoft.com/office/thememl/2012/main" name="Office Theme" id="{62F939B6-93AF-4DB8-9C6B-D6C7DFDC589F}" vid="{4A3C46E8-61CC-4603-A589-7422A47A8E4A}"/>
+      <thm15:themeFamily xmlns:thm15="http://schemas.microsoft.com/office/thememl/2012/main" xmlns="" name="Office Theme" id="{62F939B6-93AF-4DB8-9C6B-D6C7DFDC589F}" vid="{4A3C46E8-61CC-4603-A589-7422A47A8E4A}"/>
     </a:ext>
   </a:extLst>
 </a:theme>

</xml_diff>